<commit_message>
update getting started and schematic with SDK instead of Studio
</commit_message>
<xml_diff>
--- a/overview/images/2_download.pptx
+++ b/overview/images/2_download.pptx
@@ -229,7 +229,7 @@
               <a:rPr lang="fr-FR" smtClean="0">
                 <a:latin typeface="Calibri Regular" charset="0"/>
               </a:rPr>
-              <a:t>February 20</a:t>
+              <a:t>avril 22</a:t>
             </a:fld>
             <a:endParaRPr lang="en-US" dirty="0">
               <a:latin typeface="Calibri Regular" charset="0"/>
@@ -408,7 +408,7 @@
             <a:fld id="{79958FA1-9FE8-F149-AB4B-7DC9950B39E9}" type="datetime6">
               <a:rPr lang="fr-FR" smtClean="0"/>
               <a:pPr/>
-              <a:t>February 20</a:t>
+              <a:t>avril 22</a:t>
             </a:fld>
             <a:endParaRPr lang="en-US" dirty="0"/>
           </a:p>
@@ -1171,7 +1171,7 @@
           <a:p>
             <a:fld id="{7E8DAAE0-7A9E-9F46-B84D-C44AC8DB25A2}" type="datetime6">
               <a:rPr lang="fr-FR" smtClean="0"/>
-              <a:t>February 20</a:t>
+              <a:t>avril 22</a:t>
             </a:fld>
             <a:endParaRPr lang="en-US" dirty="0"/>
           </a:p>
@@ -1328,7 +1328,7 @@
           <a:p>
             <a:fld id="{F9582307-04DB-2F4D-BDB0-614E4902BA9E}" type="datetime6">
               <a:rPr lang="fr-FR" smtClean="0"/>
-              <a:t>February 20</a:t>
+              <a:t>avril 22</a:t>
             </a:fld>
             <a:endParaRPr lang="en-US" dirty="0"/>
           </a:p>
@@ -1481,7 +1481,7 @@
           <a:p>
             <a:fld id="{180A4ADF-D2E2-C44F-9BED-DE909ECFAA4C}" type="datetime6">
               <a:rPr lang="fr-FR" smtClean="0"/>
-              <a:t>February 20</a:t>
+              <a:t>avril 22</a:t>
             </a:fld>
             <a:endParaRPr lang="en-US" dirty="0"/>
           </a:p>
@@ -1689,7 +1689,7 @@
             <a:fld id="{22DD8F49-BF83-0E4D-8954-2DA98C3220A2}" type="datetime6">
               <a:rPr lang="fr-FR" smtClean="0"/>
               <a:pPr/>
-              <a:t>February 20</a:t>
+              <a:t>avril 22</a:t>
             </a:fld>
             <a:endParaRPr lang="en-US" dirty="0"/>
           </a:p>
@@ -2663,7 +2663,7 @@
           <a:p>
             <a:fld id="{CFBFD163-B769-8340-9BFA-850DE925A786}" type="datetime6">
               <a:rPr lang="fr-FR" smtClean="0"/>
-              <a:t>February 20</a:t>
+              <a:t>avril 22</a:t>
             </a:fld>
             <a:endParaRPr lang="en-US" dirty="0"/>
           </a:p>
@@ -2770,7 +2770,7 @@
           <a:p>
             <a:fld id="{D6DDDD81-934D-2440-96D5-710E55CF1726}" type="datetime6">
               <a:rPr lang="fr-FR" smtClean="0"/>
-              <a:t>February 20</a:t>
+              <a:t>avril 22</a:t>
             </a:fld>
             <a:endParaRPr lang="en-US" dirty="0"/>
           </a:p>
@@ -3443,7 +3443,7 @@
           <a:p>
             <a:fld id="{9FC060DB-6E52-EB46-96C1-740CFB82B988}" type="datetime6">
               <a:rPr lang="fr-FR" smtClean="0"/>
-              <a:t>February 20</a:t>
+              <a:t>avril 22</a:t>
             </a:fld>
             <a:endParaRPr lang="en-US" dirty="0"/>
           </a:p>
@@ -3591,7 +3591,7 @@
           <a:p>
             <a:fld id="{DF677A4E-A05D-044B-B606-EB8FC4116036}" type="datetime6">
               <a:rPr lang="fr-FR" smtClean="0"/>
-              <a:t>February 20</a:t>
+              <a:t>avril 22</a:t>
             </a:fld>
             <a:endParaRPr lang="en-US" dirty="0"/>
           </a:p>
@@ -3743,7 +3743,7 @@
             <a:fld id="{D4BF065C-C26E-9B4C-AB1D-0F16CDF9EF28}" type="datetime6">
               <a:rPr lang="fr-FR" smtClean="0"/>
               <a:pPr/>
-              <a:t>February 20</a:t>
+              <a:t>avril 22</a:t>
             </a:fld>
             <a:endParaRPr lang="en-US" dirty="0"/>
           </a:p>
@@ -4021,7 +4021,7 @@
             <a:fld id="{22DD8F49-BF83-0E4D-8954-2DA98C3220A2}" type="datetime6">
               <a:rPr lang="fr-FR" smtClean="0"/>
               <a:pPr/>
-              <a:t>February 20</a:t>
+              <a:t>avril 22</a:t>
             </a:fld>
             <a:endParaRPr lang="en-US" dirty="0"/>
           </a:p>
@@ -4394,470 +4394,864 @@
           <a:chExt cx="0" cy="0"/>
         </a:xfrm>
       </p:grpSpPr>
+      <p:sp>
+        <p:nvSpPr>
+          <p:cNvPr id="64" name="Rounded Rectangle 63"/>
+          <p:cNvSpPr/>
+          <p:nvPr/>
+        </p:nvSpPr>
+        <p:spPr>
+          <a:xfrm>
+            <a:off x="938616" y="4330645"/>
+            <a:ext cx="2066064" cy="1900807"/>
+          </a:xfrm>
+          <a:prstGeom prst="roundRect">
+            <a:avLst>
+              <a:gd name="adj" fmla="val 15733"/>
+            </a:avLst>
+          </a:prstGeom>
+          <a:solidFill>
+            <a:schemeClr val="bg1"/>
+          </a:solidFill>
+          <a:ln w="12700">
+            <a:solidFill>
+              <a:schemeClr val="bg2"/>
+            </a:solidFill>
+          </a:ln>
+        </p:spPr>
+        <p:style>
+          <a:lnRef idx="2">
+            <a:schemeClr val="accent1">
+              <a:shade val="50000"/>
+            </a:schemeClr>
+          </a:lnRef>
+          <a:fillRef idx="1">
+            <a:schemeClr val="accent1"/>
+          </a:fillRef>
+          <a:effectRef idx="0">
+            <a:schemeClr val="accent1"/>
+          </a:effectRef>
+          <a:fontRef idx="minor">
+            <a:schemeClr val="lt1"/>
+          </a:fontRef>
+        </p:style>
+        <p:txBody>
+          <a:bodyPr rtlCol="0" anchor="ctr"/>
+          <a:lstStyle/>
+          <a:p>
+            <a:pPr algn="ctr"/>
+            <a:endParaRPr lang="en-US" dirty="0"/>
+          </a:p>
+        </p:txBody>
+      </p:sp>
+      <p:sp>
+        <p:nvSpPr>
+          <p:cNvPr id="102" name="Rounded Rectangle 101"/>
+          <p:cNvSpPr/>
+          <p:nvPr/>
+        </p:nvSpPr>
+        <p:spPr>
+          <a:xfrm>
+            <a:off x="938617" y="2292007"/>
+            <a:ext cx="5800796" cy="1212313"/>
+          </a:xfrm>
+          <a:prstGeom prst="roundRect">
+            <a:avLst>
+              <a:gd name="adj" fmla="val 15733"/>
+            </a:avLst>
+          </a:prstGeom>
+          <a:solidFill>
+            <a:schemeClr val="bg1"/>
+          </a:solidFill>
+          <a:ln w="12700">
+            <a:solidFill>
+              <a:schemeClr val="bg2"/>
+            </a:solidFill>
+          </a:ln>
+        </p:spPr>
+        <p:style>
+          <a:lnRef idx="2">
+            <a:schemeClr val="accent1">
+              <a:shade val="50000"/>
+            </a:schemeClr>
+          </a:lnRef>
+          <a:fillRef idx="1">
+            <a:schemeClr val="accent1"/>
+          </a:fillRef>
+          <a:effectRef idx="0">
+            <a:schemeClr val="accent1"/>
+          </a:effectRef>
+          <a:fontRef idx="minor">
+            <a:schemeClr val="lt1"/>
+          </a:fontRef>
+        </p:style>
+        <p:txBody>
+          <a:bodyPr rtlCol="0" anchor="ctr"/>
+          <a:lstStyle/>
+          <a:p>
+            <a:pPr algn="ctr"/>
+            <a:r>
+              <a:rPr lang="en-US"/>
+              <a:t>vz</a:t>
+            </a:r>
+            <a:endParaRPr lang="en-US" dirty="0"/>
+          </a:p>
+        </p:txBody>
+      </p:sp>
+      <p:sp>
+        <p:nvSpPr>
+          <p:cNvPr id="103" name="Rounded Rectangle 102"/>
+          <p:cNvSpPr/>
+          <p:nvPr/>
+        </p:nvSpPr>
+        <p:spPr>
+          <a:xfrm>
+            <a:off x="8171174" y="4576738"/>
+            <a:ext cx="2797476" cy="1271276"/>
+          </a:xfrm>
+          <a:prstGeom prst="roundRect">
+            <a:avLst>
+              <a:gd name="adj" fmla="val 15733"/>
+            </a:avLst>
+          </a:prstGeom>
+          <a:solidFill>
+            <a:schemeClr val="bg1"/>
+          </a:solidFill>
+          <a:ln w="12700">
+            <a:solidFill>
+              <a:schemeClr val="bg2"/>
+            </a:solidFill>
+          </a:ln>
+        </p:spPr>
+        <p:style>
+          <a:lnRef idx="2">
+            <a:schemeClr val="accent1">
+              <a:shade val="50000"/>
+            </a:schemeClr>
+          </a:lnRef>
+          <a:fillRef idx="1">
+            <a:schemeClr val="accent1"/>
+          </a:fillRef>
+          <a:effectRef idx="0">
+            <a:schemeClr val="accent1"/>
+          </a:effectRef>
+          <a:fontRef idx="minor">
+            <a:schemeClr val="lt1"/>
+          </a:fontRef>
+        </p:style>
+        <p:txBody>
+          <a:bodyPr rtlCol="0" anchor="ctr"/>
+          <a:lstStyle/>
+          <a:p>
+            <a:pPr algn="ctr"/>
+            <a:endParaRPr lang="en-US" dirty="0"/>
+          </a:p>
+        </p:txBody>
+      </p:sp>
+      <p:sp>
+        <p:nvSpPr>
+          <p:cNvPr id="98" name="Rounded Rectangle 97"/>
+          <p:cNvSpPr/>
+          <p:nvPr/>
+        </p:nvSpPr>
+        <p:spPr>
+          <a:xfrm>
+            <a:off x="3903618" y="105508"/>
+            <a:ext cx="2835795" cy="1212313"/>
+          </a:xfrm>
+          <a:prstGeom prst="roundRect">
+            <a:avLst>
+              <a:gd name="adj" fmla="val 15733"/>
+            </a:avLst>
+          </a:prstGeom>
+          <a:solidFill>
+            <a:schemeClr val="bg1"/>
+          </a:solidFill>
+          <a:ln w="12700">
+            <a:solidFill>
+              <a:schemeClr val="bg2"/>
+            </a:solidFill>
+          </a:ln>
+        </p:spPr>
+        <p:style>
+          <a:lnRef idx="2">
+            <a:schemeClr val="accent1">
+              <a:shade val="50000"/>
+            </a:schemeClr>
+          </a:lnRef>
+          <a:fillRef idx="1">
+            <a:schemeClr val="accent1"/>
+          </a:fillRef>
+          <a:effectRef idx="0">
+            <a:schemeClr val="accent1"/>
+          </a:effectRef>
+          <a:fontRef idx="minor">
+            <a:schemeClr val="lt1"/>
+          </a:fontRef>
+        </p:style>
+        <p:txBody>
+          <a:bodyPr rtlCol="0" anchor="ctr"/>
+          <a:lstStyle/>
+          <a:p>
+            <a:pPr algn="ctr"/>
+            <a:r>
+              <a:rPr lang="en-US"/>
+              <a:t>vz</a:t>
+            </a:r>
+            <a:endParaRPr lang="en-US" dirty="0"/>
+          </a:p>
+        </p:txBody>
+      </p:sp>
+      <p:sp>
+        <p:nvSpPr>
+          <p:cNvPr id="32" name="Rounded Rectangle 31"/>
+          <p:cNvSpPr/>
+          <p:nvPr/>
+        </p:nvSpPr>
+        <p:spPr>
+          <a:xfrm>
+            <a:off x="938616" y="105508"/>
+            <a:ext cx="2835795" cy="1212313"/>
+          </a:xfrm>
+          <a:prstGeom prst="roundRect">
+            <a:avLst>
+              <a:gd name="adj" fmla="val 15733"/>
+            </a:avLst>
+          </a:prstGeom>
+          <a:solidFill>
+            <a:schemeClr val="bg1"/>
+          </a:solidFill>
+          <a:ln w="12700">
+            <a:solidFill>
+              <a:schemeClr val="bg2"/>
+            </a:solidFill>
+          </a:ln>
+        </p:spPr>
+        <p:style>
+          <a:lnRef idx="2">
+            <a:schemeClr val="accent1">
+              <a:shade val="50000"/>
+            </a:schemeClr>
+          </a:lnRef>
+          <a:fillRef idx="1">
+            <a:schemeClr val="accent1"/>
+          </a:fillRef>
+          <a:effectRef idx="0">
+            <a:schemeClr val="accent1"/>
+          </a:effectRef>
+          <a:fontRef idx="minor">
+            <a:schemeClr val="lt1"/>
+          </a:fontRef>
+        </p:style>
+        <p:txBody>
+          <a:bodyPr rtlCol="0" anchor="ctr"/>
+          <a:lstStyle/>
+          <a:p>
+            <a:pPr algn="ctr"/>
+            <a:r>
+              <a:rPr lang="en-US"/>
+              <a:t>vz</a:t>
+            </a:r>
+            <a:endParaRPr lang="en-US" dirty="0"/>
+          </a:p>
+        </p:txBody>
+      </p:sp>
+      <p:sp>
+        <p:nvSpPr>
+          <p:cNvPr id="51" name="TextBox 37"/>
+          <p:cNvSpPr txBox="1"/>
+          <p:nvPr/>
+        </p:nvSpPr>
+        <p:spPr>
+          <a:xfrm>
+            <a:off x="6983516" y="2590209"/>
+            <a:ext cx="906017" cy="287130"/>
+          </a:xfrm>
+          <a:prstGeom prst="rect">
+            <a:avLst/>
+          </a:prstGeom>
+          <a:noFill/>
+        </p:spPr>
+        <p:txBody>
+          <a:bodyPr wrap="none" rtlCol="0">
+            <a:spAutoFit/>
+          </a:bodyPr>
+          <a:lstStyle/>
+          <a:p>
+            <a:pPr algn="ctr">
+              <a:lnSpc>
+                <a:spcPts val="1400"/>
+              </a:lnSpc>
+            </a:pPr>
+            <a:r>
+              <a:rPr lang="en-US" dirty="0">
+                <a:solidFill>
+                  <a:schemeClr val="accent1"/>
+                </a:solidFill>
+                <a:latin typeface="Source Sans Pro" charset="0"/>
+                <a:ea typeface="Source Sans Pro" charset="0"/>
+                <a:cs typeface="Source Sans Pro" charset="0"/>
+              </a:rPr>
+              <a:t>Publish</a:t>
+            </a:r>
+          </a:p>
+        </p:txBody>
+      </p:sp>
+      <p:sp>
+        <p:nvSpPr>
+          <p:cNvPr id="60" name="TextBox 59"/>
+          <p:cNvSpPr txBox="1"/>
+          <p:nvPr/>
+        </p:nvSpPr>
+        <p:spPr>
+          <a:xfrm>
+            <a:off x="8239420" y="4991851"/>
+            <a:ext cx="934014" cy="411257"/>
+          </a:xfrm>
+          <a:prstGeom prst="rect">
+            <a:avLst/>
+          </a:prstGeom>
+          <a:solidFill>
+            <a:schemeClr val="bg1"/>
+          </a:solidFill>
+        </p:spPr>
+        <p:txBody>
+          <a:bodyPr wrap="square" tIns="36000" bIns="36000" rtlCol="0">
+            <a:spAutoFit/>
+          </a:bodyPr>
+          <a:lstStyle/>
+          <a:p>
+            <a:pPr algn="ctr" defTabSz="685783">
+              <a:buClrTx/>
+            </a:pPr>
+            <a:r>
+              <a:rPr lang="en-US" sz="2200" dirty="0" smtClean="0">
+                <a:solidFill>
+                  <a:schemeClr val="tx1">
+                    <a:lumMod val="75000"/>
+                  </a:schemeClr>
+                </a:solidFill>
+                <a:latin typeface="Source Sans Pro Light" charset="0"/>
+                <a:ea typeface="Source Sans Pro Light" charset="0"/>
+                <a:cs typeface="Source Sans Pro Light" charset="0"/>
+              </a:rPr>
+              <a:t>Target</a:t>
+            </a:r>
+            <a:endParaRPr lang="en-US" sz="2200" dirty="0">
+              <a:solidFill>
+                <a:schemeClr val="tx1">
+                  <a:lumMod val="75000"/>
+                </a:schemeClr>
+              </a:solidFill>
+              <a:latin typeface="Source Sans Pro Light" charset="0"/>
+              <a:ea typeface="Source Sans Pro Light" charset="0"/>
+              <a:cs typeface="Source Sans Pro Light" charset="0"/>
+            </a:endParaRPr>
+          </a:p>
+        </p:txBody>
+      </p:sp>
+      <p:pic>
+        <p:nvPicPr>
+          <p:cNvPr id="69" name="Picture 68"/>
+          <p:cNvPicPr>
+            <a:picLocks noChangeAspect="1"/>
+          </p:cNvPicPr>
+          <p:nvPr/>
+        </p:nvPicPr>
+        <p:blipFill>
+          <a:blip r:embed="rId2" cstate="print">
+            <a:extLst>
+              <a:ext uri="{28A0092B-C50C-407E-A947-70E740481C1C}">
+                <a14:useLocalDpi xmlns:a14="http://schemas.microsoft.com/office/drawing/2010/main" val="0"/>
+              </a:ext>
+            </a:extLst>
+          </a:blip>
+          <a:stretch>
+            <a:fillRect/>
+          </a:stretch>
+        </p:blipFill>
+        <p:spPr>
+          <a:xfrm rot="14400000">
+            <a:off x="3797192" y="321260"/>
+            <a:ext cx="1417466" cy="772518"/>
+          </a:xfrm>
+          <a:prstGeom prst="rect">
+            <a:avLst/>
+          </a:prstGeom>
+        </p:spPr>
+      </p:pic>
       <p:grpSp>
         <p:nvGrpSpPr>
-          <p:cNvPr id="181" name="Group 180"/>
+          <p:cNvPr id="10" name="Group 9"/>
           <p:cNvGrpSpPr/>
           <p:nvPr/>
         </p:nvGrpSpPr>
         <p:grpSpPr>
           <a:xfrm>
-            <a:off x="938616" y="418154"/>
-            <a:ext cx="9918264" cy="5842215"/>
-            <a:chOff x="938616" y="418154"/>
-            <a:chExt cx="9918264" cy="5842215"/>
+            <a:off x="3992351" y="2125734"/>
+            <a:ext cx="1158355" cy="1367382"/>
+            <a:chOff x="3878499" y="2275879"/>
+            <a:chExt cx="1172018" cy="1383510"/>
+          </a:xfrm>
+        </p:grpSpPr>
+        <p:grpSp>
+          <p:nvGrpSpPr>
+            <p:cNvPr id="174" name="Group 173"/>
+            <p:cNvGrpSpPr/>
+            <p:nvPr/>
+          </p:nvGrpSpPr>
+          <p:grpSpPr>
+            <a:xfrm>
+              <a:off x="3878499" y="2275879"/>
+              <a:ext cx="1172018" cy="1383510"/>
+              <a:chOff x="8498011" y="1260355"/>
+              <a:chExt cx="1673582" cy="2222193"/>
+            </a:xfrm>
+          </p:grpSpPr>
+          <p:pic>
+            <p:nvPicPr>
+              <p:cNvPr id="175" name="Picture 174"/>
+              <p:cNvPicPr>
+                <a:picLocks noChangeAspect="1"/>
+              </p:cNvPicPr>
+              <p:nvPr/>
+            </p:nvPicPr>
+            <p:blipFill rotWithShape="1">
+              <a:blip r:embed="rId3" cstate="print">
+                <a:extLst>
+                  <a:ext uri="{28A0092B-C50C-407E-A947-70E740481C1C}">
+                    <a14:useLocalDpi xmlns:a14="http://schemas.microsoft.com/office/drawing/2010/main" val="0"/>
+                  </a:ext>
+                </a:extLst>
+              </a:blip>
+              <a:srcRect l="18934" r="18934"/>
+              <a:stretch/>
+            </p:blipFill>
+            <p:spPr>
+              <a:xfrm>
+                <a:off x="8498011" y="1260355"/>
+                <a:ext cx="1673582" cy="2222193"/>
+              </a:xfrm>
+              <a:prstGeom prst="rect">
+                <a:avLst/>
+              </a:prstGeom>
+            </p:spPr>
+          </p:pic>
+          <p:pic>
+            <p:nvPicPr>
+              <p:cNvPr id="176" name="Picture 175"/>
+              <p:cNvPicPr>
+                <a:picLocks noChangeAspect="1"/>
+              </p:cNvPicPr>
+              <p:nvPr/>
+            </p:nvPicPr>
+            <p:blipFill>
+              <a:blip r:embed="rId4" cstate="print">
+                <a:extLst>
+                  <a:ext uri="{28A0092B-C50C-407E-A947-70E740481C1C}">
+                    <a14:useLocalDpi xmlns:a14="http://schemas.microsoft.com/office/drawing/2010/main" val="0"/>
+                  </a:ext>
+                </a:extLst>
+              </a:blip>
+              <a:stretch>
+                <a:fillRect/>
+              </a:stretch>
+            </p:blipFill>
+            <p:spPr>
+              <a:xfrm rot="14400000">
+                <a:off x="8997932" y="1799769"/>
+                <a:ext cx="1201542" cy="654841"/>
+              </a:xfrm>
+              <a:prstGeom prst="rect">
+                <a:avLst/>
+              </a:prstGeom>
+            </p:spPr>
+          </p:pic>
+        </p:grpSp>
+        <p:grpSp>
+          <p:nvGrpSpPr>
+            <p:cNvPr id="6" name="Group 5"/>
+            <p:cNvGrpSpPr/>
+            <p:nvPr/>
+          </p:nvGrpSpPr>
+          <p:grpSpPr>
+            <a:xfrm>
+              <a:off x="4174836" y="2388513"/>
+              <a:ext cx="198000" cy="182021"/>
+              <a:chOff x="2464217" y="2519136"/>
+              <a:chExt cx="618701" cy="639769"/>
+            </a:xfrm>
+          </p:grpSpPr>
+          <p:sp>
+            <p:nvSpPr>
+              <p:cNvPr id="92" name="Rectangle 91"/>
+              <p:cNvSpPr/>
+              <p:nvPr/>
+            </p:nvSpPr>
+            <p:spPr>
+              <a:xfrm>
+                <a:off x="2464217" y="2519136"/>
+                <a:ext cx="618701" cy="639769"/>
+              </a:xfrm>
+              <a:prstGeom prst="rect">
+                <a:avLst/>
+              </a:prstGeom>
+              <a:solidFill>
+                <a:schemeClr val="bg1"/>
+              </a:solidFill>
+              <a:ln>
+                <a:noFill/>
+              </a:ln>
+              <a:scene3d>
+                <a:camera prst="isometricLeftDown"/>
+                <a:lightRig rig="threePt" dir="t"/>
+              </a:scene3d>
+            </p:spPr>
+            <p:style>
+              <a:lnRef idx="2">
+                <a:schemeClr val="accent1">
+                  <a:shade val="50000"/>
+                </a:schemeClr>
+              </a:lnRef>
+              <a:fillRef idx="1">
+                <a:schemeClr val="accent1"/>
+              </a:fillRef>
+              <a:effectRef idx="0">
+                <a:schemeClr val="accent1"/>
+              </a:effectRef>
+              <a:fontRef idx="minor">
+                <a:schemeClr val="lt1"/>
+              </a:fontRef>
+            </p:style>
+            <p:txBody>
+              <a:bodyPr rtlCol="0" anchor="ctr"/>
+              <a:lstStyle/>
+              <a:p>
+                <a:pPr algn="ctr"/>
+                <a:r>
+                  <a:rPr lang="en-US" smtClean="0"/>
+                  <a:t>v</a:t>
+                </a:r>
+                <a:endParaRPr lang="en-US"/>
+              </a:p>
+            </p:txBody>
+          </p:sp>
+          <p:pic>
+            <p:nvPicPr>
+              <p:cNvPr id="93" name="Picture 92"/>
+              <p:cNvPicPr>
+                <a:picLocks noChangeAspect="1"/>
+              </p:cNvPicPr>
+              <p:nvPr/>
+            </p:nvPicPr>
+            <p:blipFill>
+              <a:blip r:embed="rId5" cstate="print">
+                <a:extLst>
+                  <a:ext uri="{28A0092B-C50C-407E-A947-70E740481C1C}">
+                    <a14:useLocalDpi xmlns:a14="http://schemas.microsoft.com/office/drawing/2010/main" val="0"/>
+                  </a:ext>
+                </a:extLst>
+              </a:blip>
+              <a:stretch>
+                <a:fillRect/>
+              </a:stretch>
+            </p:blipFill>
+            <p:spPr>
+              <a:xfrm>
+                <a:off x="2515027" y="2575985"/>
+                <a:ext cx="509063" cy="559968"/>
+              </a:xfrm>
+              <a:prstGeom prst="rect">
+                <a:avLst/>
+              </a:prstGeom>
+              <a:scene3d>
+                <a:camera prst="isometricLeftDown"/>
+                <a:lightRig rig="threePt" dir="t"/>
+              </a:scene3d>
+            </p:spPr>
+          </p:pic>
+        </p:grpSp>
+      </p:grpSp>
+      <p:sp>
+        <p:nvSpPr>
+          <p:cNvPr id="95" name="TextBox 94"/>
+          <p:cNvSpPr txBox="1"/>
+          <p:nvPr/>
+        </p:nvSpPr>
+        <p:spPr>
+          <a:xfrm>
+            <a:off x="1121755" y="2542104"/>
+            <a:ext cx="2179553" cy="411257"/>
+          </a:xfrm>
+          <a:prstGeom prst="rect">
+            <a:avLst/>
+          </a:prstGeom>
+          <a:solidFill>
+            <a:schemeClr val="bg1"/>
+          </a:solidFill>
+        </p:spPr>
+        <p:txBody>
+          <a:bodyPr wrap="square" tIns="36000" bIns="36000" rtlCol="0">
+            <a:spAutoFit/>
+          </a:bodyPr>
+          <a:lstStyle/>
+          <a:p>
+            <a:pPr algn="ctr" defTabSz="685783">
+              <a:buClrTx/>
+            </a:pPr>
+            <a:r>
+              <a:rPr lang="en-US" sz="2200" dirty="0" smtClean="0">
+                <a:solidFill>
+                  <a:schemeClr val="tx1">
+                    <a:lumMod val="75000"/>
+                  </a:schemeClr>
+                </a:solidFill>
+                <a:latin typeface="Source Sans Pro Light" charset="0"/>
+                <a:ea typeface="Source Sans Pro Light" charset="0"/>
+                <a:cs typeface="Source Sans Pro Light" charset="0"/>
+              </a:rPr>
+              <a:t>Your Workstation</a:t>
+            </a:r>
+            <a:endParaRPr lang="en-US" sz="2200" dirty="0">
+              <a:solidFill>
+                <a:schemeClr val="tx1">
+                  <a:lumMod val="75000"/>
+                </a:schemeClr>
+              </a:solidFill>
+              <a:latin typeface="Source Sans Pro Light" charset="0"/>
+              <a:ea typeface="Source Sans Pro Light" charset="0"/>
+              <a:cs typeface="Source Sans Pro Light" charset="0"/>
+            </a:endParaRPr>
+          </a:p>
+        </p:txBody>
+      </p:sp>
+      <p:sp>
+        <p:nvSpPr>
+          <p:cNvPr id="96" name="TextBox 21"/>
+          <p:cNvSpPr txBox="1"/>
+          <p:nvPr/>
+        </p:nvSpPr>
+        <p:spPr>
+          <a:xfrm>
+            <a:off x="2293650" y="207488"/>
+            <a:ext cx="1402085" cy="1015663"/>
+          </a:xfrm>
+          <a:prstGeom prst="rect">
+            <a:avLst/>
+          </a:prstGeom>
+          <a:noFill/>
+        </p:spPr>
+        <p:txBody>
+          <a:bodyPr wrap="square" rtlCol="0">
+            <a:spAutoFit/>
+          </a:bodyPr>
+          <a:lstStyle/>
+          <a:p>
+            <a:pPr algn="ctr" defTabSz="685783"/>
+            <a:r>
+              <a:rPr lang="en-US" sz="2000" dirty="0" smtClean="0">
+                <a:solidFill>
+                  <a:schemeClr val="tx1">
+                    <a:lumMod val="75000"/>
+                  </a:schemeClr>
+                </a:solidFill>
+                <a:latin typeface="Source Sans Pro Light" charset="0"/>
+                <a:ea typeface="Source Sans Pro Light" charset="0"/>
+                <a:cs typeface="Source Sans Pro Light" charset="0"/>
+              </a:rPr>
+              <a:t>SDK Tools Software </a:t>
+            </a:r>
+            <a:r>
+              <a:rPr lang="en-US" sz="2000" dirty="0" smtClean="0">
+                <a:solidFill>
+                  <a:schemeClr val="tx1">
+                    <a:lumMod val="75000"/>
+                  </a:schemeClr>
+                </a:solidFill>
+                <a:latin typeface="Source Sans Pro Light" charset="0"/>
+                <a:ea typeface="Source Sans Pro Light" charset="0"/>
+                <a:cs typeface="Source Sans Pro Light" charset="0"/>
+              </a:rPr>
+              <a:t/>
+            </a:r>
+            <a:br>
+              <a:rPr lang="en-US" sz="2000" dirty="0" smtClean="0">
+                <a:solidFill>
+                  <a:schemeClr val="tx1">
+                    <a:lumMod val="75000"/>
+                  </a:schemeClr>
+                </a:solidFill>
+                <a:latin typeface="Source Sans Pro Light" charset="0"/>
+                <a:ea typeface="Source Sans Pro Light" charset="0"/>
+                <a:cs typeface="Source Sans Pro Light" charset="0"/>
+              </a:rPr>
+            </a:br>
+            <a:r>
+              <a:rPr lang="en-US" sz="2000" dirty="0" smtClean="0">
+                <a:solidFill>
+                  <a:schemeClr val="tx1">
+                    <a:lumMod val="75000"/>
+                  </a:schemeClr>
+                </a:solidFill>
+                <a:latin typeface="Source Sans Pro Light" charset="0"/>
+                <a:ea typeface="Source Sans Pro Light" charset="0"/>
+                <a:cs typeface="Source Sans Pro Light" charset="0"/>
+              </a:rPr>
+              <a:t>(.exe)</a:t>
+            </a:r>
+            <a:endParaRPr lang="en-US" sz="2000" dirty="0">
+              <a:solidFill>
+                <a:schemeClr val="tx1">
+                  <a:lumMod val="75000"/>
+                </a:schemeClr>
+              </a:solidFill>
+              <a:latin typeface="Source Sans Pro Light" charset="0"/>
+              <a:ea typeface="Source Sans Pro Light" charset="0"/>
+              <a:cs typeface="Source Sans Pro Light" charset="0"/>
+            </a:endParaRPr>
+          </a:p>
+        </p:txBody>
+      </p:sp>
+      <p:sp>
+        <p:nvSpPr>
+          <p:cNvPr id="97" name="TextBox 21"/>
+          <p:cNvSpPr txBox="1"/>
+          <p:nvPr/>
+        </p:nvSpPr>
+        <p:spPr>
+          <a:xfrm>
+            <a:off x="4897605" y="207489"/>
+            <a:ext cx="1759230" cy="1015663"/>
+          </a:xfrm>
+          <a:prstGeom prst="rect">
+            <a:avLst/>
+          </a:prstGeom>
+          <a:noFill/>
+        </p:spPr>
+        <p:txBody>
+          <a:bodyPr wrap="square" rtlCol="0">
+            <a:spAutoFit/>
+          </a:bodyPr>
+          <a:lstStyle/>
+          <a:p>
+            <a:pPr algn="ctr" defTabSz="685783"/>
+            <a:r>
+              <a:rPr lang="en-US" sz="2000" dirty="0" smtClean="0">
+                <a:solidFill>
+                  <a:schemeClr val="tx1">
+                    <a:lumMod val="75000"/>
+                  </a:schemeClr>
+                </a:solidFill>
+                <a:latin typeface="Source Sans Pro Light" charset="0"/>
+                <a:ea typeface="Source Sans Pro Light" charset="0"/>
+                <a:cs typeface="Source Sans Pro Light" charset="0"/>
+              </a:rPr>
+              <a:t>Platform </a:t>
+            </a:r>
+          </a:p>
+          <a:p>
+            <a:pPr algn="ctr" defTabSz="685783"/>
+            <a:r>
+              <a:rPr lang="en-US" sz="2000" dirty="0" smtClean="0">
+                <a:solidFill>
+                  <a:schemeClr val="tx1">
+                    <a:lumMod val="75000"/>
+                  </a:schemeClr>
+                </a:solidFill>
+                <a:latin typeface="Source Sans Pro Light" charset="0"/>
+                <a:ea typeface="Source Sans Pro Light" charset="0"/>
+                <a:cs typeface="Source Sans Pro Light" charset="0"/>
+              </a:rPr>
+              <a:t>or</a:t>
+            </a:r>
+            <a:r>
+              <a:rPr lang="en-US" sz="2000" dirty="0" smtClean="0">
+                <a:solidFill>
+                  <a:schemeClr val="tx1">
+                    <a:lumMod val="75000"/>
+                  </a:schemeClr>
+                </a:solidFill>
+                <a:latin typeface="Source Sans Pro Light" charset="0"/>
+                <a:ea typeface="Source Sans Pro Light" charset="0"/>
+                <a:cs typeface="Source Sans Pro Light" charset="0"/>
+              </a:rPr>
+              <a:t/>
+            </a:r>
+            <a:br>
+              <a:rPr lang="en-US" sz="2000" dirty="0" smtClean="0">
+                <a:solidFill>
+                  <a:schemeClr val="tx1">
+                    <a:lumMod val="75000"/>
+                  </a:schemeClr>
+                </a:solidFill>
+                <a:latin typeface="Source Sans Pro Light" charset="0"/>
+                <a:ea typeface="Source Sans Pro Light" charset="0"/>
+                <a:cs typeface="Source Sans Pro Light" charset="0"/>
+              </a:rPr>
+            </a:br>
+            <a:r>
+              <a:rPr lang="en-US" sz="2000" dirty="0" smtClean="0">
+                <a:solidFill>
+                  <a:schemeClr val="tx1">
+                    <a:lumMod val="75000"/>
+                  </a:schemeClr>
+                </a:solidFill>
+                <a:latin typeface="Source Sans Pro Light" charset="0"/>
+                <a:ea typeface="Source Sans Pro Light" charset="0"/>
+                <a:cs typeface="Source Sans Pro Light" charset="0"/>
+              </a:rPr>
+              <a:t>Virtual </a:t>
+            </a:r>
+            <a:r>
+              <a:rPr lang="en-US" sz="2000" dirty="0" smtClean="0">
+                <a:solidFill>
+                  <a:schemeClr val="tx1">
+                    <a:lumMod val="75000"/>
+                  </a:schemeClr>
+                </a:solidFill>
+                <a:latin typeface="Source Sans Pro Light" charset="0"/>
+                <a:ea typeface="Source Sans Pro Light" charset="0"/>
+                <a:cs typeface="Source Sans Pro Light" charset="0"/>
+              </a:rPr>
+              <a:t>Device</a:t>
+            </a:r>
+            <a:endParaRPr lang="en-US" sz="2000" dirty="0">
+              <a:solidFill>
+                <a:schemeClr val="tx1">
+                  <a:lumMod val="75000"/>
+                </a:schemeClr>
+              </a:solidFill>
+              <a:latin typeface="Source Sans Pro Light" charset="0"/>
+              <a:ea typeface="Source Sans Pro Light" charset="0"/>
+              <a:cs typeface="Source Sans Pro Light" charset="0"/>
+            </a:endParaRPr>
+          </a:p>
+        </p:txBody>
+      </p:sp>
+      <p:grpSp>
+        <p:nvGrpSpPr>
+          <p:cNvPr id="26" name="Group 25"/>
+          <p:cNvGrpSpPr/>
+          <p:nvPr/>
+        </p:nvGrpSpPr>
+        <p:grpSpPr>
+          <a:xfrm>
+            <a:off x="2335416" y="1480477"/>
+            <a:ext cx="807548" cy="573493"/>
+            <a:chOff x="1127448" y="1585249"/>
+            <a:chExt cx="807548" cy="573493"/>
           </a:xfrm>
         </p:grpSpPr>
         <p:sp>
           <p:nvSpPr>
-            <p:cNvPr id="102" name="Rounded Rectangle 101"/>
-            <p:cNvSpPr/>
-            <p:nvPr/>
-          </p:nvSpPr>
-          <p:spPr>
-            <a:xfrm>
-              <a:off x="938617" y="2764146"/>
-              <a:ext cx="5800796" cy="1212313"/>
-            </a:xfrm>
-            <a:prstGeom prst="roundRect">
-              <a:avLst>
-                <a:gd name="adj" fmla="val 15733"/>
-              </a:avLst>
-            </a:prstGeom>
-            <a:solidFill>
-              <a:schemeClr val="bg1"/>
-            </a:solidFill>
-            <a:ln w="12700">
-              <a:solidFill>
-                <a:schemeClr val="bg2"/>
-              </a:solidFill>
-            </a:ln>
-          </p:spPr>
-          <p:style>
-            <a:lnRef idx="2">
-              <a:schemeClr val="accent1">
-                <a:shade val="50000"/>
-              </a:schemeClr>
-            </a:lnRef>
-            <a:fillRef idx="1">
-              <a:schemeClr val="accent1"/>
-            </a:fillRef>
-            <a:effectRef idx="0">
-              <a:schemeClr val="accent1"/>
-            </a:effectRef>
-            <a:fontRef idx="minor">
-              <a:schemeClr val="lt1"/>
-            </a:fontRef>
-          </p:style>
-          <p:txBody>
-            <a:bodyPr rtlCol="0" anchor="ctr"/>
-            <a:lstStyle/>
-            <a:p>
-              <a:pPr algn="ctr"/>
-              <a:r>
-                <a:rPr lang="en-US"/>
-                <a:t>vz</a:t>
-              </a:r>
-              <a:endParaRPr lang="en-US" dirty="0"/>
-            </a:p>
-          </p:txBody>
-        </p:sp>
-        <p:sp>
-          <p:nvSpPr>
-            <p:cNvPr id="103" name="Rounded Rectangle 102"/>
-            <p:cNvSpPr/>
-            <p:nvPr/>
-          </p:nvSpPr>
-          <p:spPr>
-            <a:xfrm>
-              <a:off x="7929652" y="2764146"/>
-              <a:ext cx="2835795" cy="1212313"/>
-            </a:xfrm>
-            <a:prstGeom prst="roundRect">
-              <a:avLst>
-                <a:gd name="adj" fmla="val 15733"/>
-              </a:avLst>
-            </a:prstGeom>
-            <a:solidFill>
-              <a:schemeClr val="bg1"/>
-            </a:solidFill>
-            <a:ln w="12700">
-              <a:solidFill>
-                <a:schemeClr val="bg2"/>
-              </a:solidFill>
-            </a:ln>
-          </p:spPr>
-          <p:style>
-            <a:lnRef idx="2">
-              <a:schemeClr val="accent1">
-                <a:shade val="50000"/>
-              </a:schemeClr>
-            </a:lnRef>
-            <a:fillRef idx="1">
-              <a:schemeClr val="accent1"/>
-            </a:fillRef>
-            <a:effectRef idx="0">
-              <a:schemeClr val="accent1"/>
-            </a:effectRef>
-            <a:fontRef idx="minor">
-              <a:schemeClr val="lt1"/>
-            </a:fontRef>
-          </p:style>
-          <p:txBody>
-            <a:bodyPr rtlCol="0" anchor="ctr"/>
-            <a:lstStyle/>
-            <a:p>
-              <a:pPr algn="ctr"/>
-              <a:endParaRPr lang="en-US" dirty="0"/>
-            </a:p>
-          </p:txBody>
-        </p:sp>
-        <p:sp>
-          <p:nvSpPr>
-            <p:cNvPr id="99" name="Rounded Rectangle 98"/>
-            <p:cNvSpPr/>
-            <p:nvPr/>
-          </p:nvSpPr>
-          <p:spPr>
-            <a:xfrm>
-              <a:off x="7929652" y="577647"/>
-              <a:ext cx="2835795" cy="1212313"/>
-            </a:xfrm>
-            <a:prstGeom prst="roundRect">
-              <a:avLst>
-                <a:gd name="adj" fmla="val 15733"/>
-              </a:avLst>
-            </a:prstGeom>
-            <a:solidFill>
-              <a:schemeClr val="bg1"/>
-            </a:solidFill>
-            <a:ln w="12700">
-              <a:solidFill>
-                <a:schemeClr val="bg2"/>
-              </a:solidFill>
-            </a:ln>
-          </p:spPr>
-          <p:style>
-            <a:lnRef idx="2">
-              <a:schemeClr val="accent1">
-                <a:shade val="50000"/>
-              </a:schemeClr>
-            </a:lnRef>
-            <a:fillRef idx="1">
-              <a:schemeClr val="accent1"/>
-            </a:fillRef>
-            <a:effectRef idx="0">
-              <a:schemeClr val="accent1"/>
-            </a:effectRef>
-            <a:fontRef idx="minor">
-              <a:schemeClr val="lt1"/>
-            </a:fontRef>
-          </p:style>
-          <p:txBody>
-            <a:bodyPr rtlCol="0" anchor="ctr"/>
-            <a:lstStyle/>
-            <a:p>
-              <a:pPr algn="ctr"/>
-              <a:r>
-                <a:rPr lang="en-US" dirty="0" err="1" smtClean="0"/>
-                <a:t>vzv</a:t>
-              </a:r>
-              <a:endParaRPr lang="en-US" dirty="0"/>
-            </a:p>
-          </p:txBody>
-        </p:sp>
-        <p:sp>
-          <p:nvSpPr>
-            <p:cNvPr id="98" name="Rounded Rectangle 97"/>
-            <p:cNvSpPr/>
-            <p:nvPr/>
-          </p:nvSpPr>
-          <p:spPr>
-            <a:xfrm>
-              <a:off x="3903618" y="577647"/>
-              <a:ext cx="2835795" cy="1212313"/>
-            </a:xfrm>
-            <a:prstGeom prst="roundRect">
-              <a:avLst>
-                <a:gd name="adj" fmla="val 15733"/>
-              </a:avLst>
-            </a:prstGeom>
-            <a:solidFill>
-              <a:schemeClr val="bg1"/>
-            </a:solidFill>
-            <a:ln w="12700">
-              <a:solidFill>
-                <a:schemeClr val="bg2"/>
-              </a:solidFill>
-            </a:ln>
-          </p:spPr>
-          <p:style>
-            <a:lnRef idx="2">
-              <a:schemeClr val="accent1">
-                <a:shade val="50000"/>
-              </a:schemeClr>
-            </a:lnRef>
-            <a:fillRef idx="1">
-              <a:schemeClr val="accent1"/>
-            </a:fillRef>
-            <a:effectRef idx="0">
-              <a:schemeClr val="accent1"/>
-            </a:effectRef>
-            <a:fontRef idx="minor">
-              <a:schemeClr val="lt1"/>
-            </a:fontRef>
-          </p:style>
-          <p:txBody>
-            <a:bodyPr rtlCol="0" anchor="ctr"/>
-            <a:lstStyle/>
-            <a:p>
-              <a:pPr algn="ctr"/>
-              <a:r>
-                <a:rPr lang="en-US"/>
-                <a:t>vz</a:t>
-              </a:r>
-              <a:endParaRPr lang="en-US" dirty="0"/>
-            </a:p>
-          </p:txBody>
-        </p:sp>
-        <p:sp>
-          <p:nvSpPr>
-            <p:cNvPr id="32" name="Rounded Rectangle 31"/>
-            <p:cNvSpPr/>
-            <p:nvPr/>
-          </p:nvSpPr>
-          <p:spPr>
-            <a:xfrm>
-              <a:off x="938616" y="577647"/>
-              <a:ext cx="2835795" cy="1212313"/>
-            </a:xfrm>
-            <a:prstGeom prst="roundRect">
-              <a:avLst>
-                <a:gd name="adj" fmla="val 15733"/>
-              </a:avLst>
-            </a:prstGeom>
-            <a:solidFill>
-              <a:schemeClr val="bg1"/>
-            </a:solidFill>
-            <a:ln w="12700">
-              <a:solidFill>
-                <a:schemeClr val="bg2"/>
-              </a:solidFill>
-            </a:ln>
-          </p:spPr>
-          <p:style>
-            <a:lnRef idx="2">
-              <a:schemeClr val="accent1">
-                <a:shade val="50000"/>
-              </a:schemeClr>
-            </a:lnRef>
-            <a:fillRef idx="1">
-              <a:schemeClr val="accent1"/>
-            </a:fillRef>
-            <a:effectRef idx="0">
-              <a:schemeClr val="accent1"/>
-            </a:effectRef>
-            <a:fontRef idx="minor">
-              <a:schemeClr val="lt1"/>
-            </a:fontRef>
-          </p:style>
-          <p:txBody>
-            <a:bodyPr rtlCol="0" anchor="ctr"/>
-            <a:lstStyle/>
-            <a:p>
-              <a:pPr algn="ctr"/>
-              <a:r>
-                <a:rPr lang="en-US"/>
-                <a:t>vz</a:t>
-              </a:r>
-              <a:endParaRPr lang="en-US" dirty="0"/>
-            </a:p>
-          </p:txBody>
-        </p:sp>
-        <p:sp>
-          <p:nvSpPr>
-            <p:cNvPr id="55" name="Rectangle 54"/>
-            <p:cNvSpPr/>
-            <p:nvPr/>
-          </p:nvSpPr>
-          <p:spPr>
-            <a:xfrm>
-              <a:off x="8548437" y="1060845"/>
-              <a:ext cx="2146620" cy="338554"/>
-            </a:xfrm>
-            <a:prstGeom prst="rect">
-              <a:avLst/>
-            </a:prstGeom>
-            <a:solidFill>
-              <a:schemeClr val="bg1"/>
-            </a:solidFill>
-            <a:ln>
-              <a:noFill/>
-            </a:ln>
-          </p:spPr>
-          <p:style>
-            <a:lnRef idx="2">
-              <a:schemeClr val="accent1">
-                <a:shade val="50000"/>
-              </a:schemeClr>
-            </a:lnRef>
-            <a:fillRef idx="1">
-              <a:schemeClr val="accent1"/>
-            </a:fillRef>
-            <a:effectRef idx="0">
-              <a:schemeClr val="accent1"/>
-            </a:effectRef>
-            <a:fontRef idx="minor">
-              <a:schemeClr val="lt1"/>
-            </a:fontRef>
-          </p:style>
-          <p:txBody>
-            <a:bodyPr rtlCol="0" anchor="ctr"/>
-            <a:lstStyle/>
-            <a:p>
-              <a:pPr algn="ctr"/>
-              <a:endParaRPr lang="en-US"/>
-            </a:p>
-          </p:txBody>
-        </p:sp>
-        <p:sp>
-          <p:nvSpPr>
-            <p:cNvPr id="29" name="TextBox 21"/>
+            <p:cNvPr id="18" name="TextBox 37"/>
             <p:cNvSpPr txBox="1"/>
             <p:nvPr/>
           </p:nvSpPr>
           <p:spPr>
             <a:xfrm>
-              <a:off x="9200749" y="667345"/>
-              <a:ext cx="1572704" cy="1015663"/>
-            </a:xfrm>
-            <a:prstGeom prst="rect">
-              <a:avLst/>
-            </a:prstGeom>
-            <a:noFill/>
-          </p:spPr>
-          <p:txBody>
-            <a:bodyPr wrap="square" rtlCol="0">
-              <a:spAutoFit/>
-            </a:bodyPr>
-            <a:lstStyle/>
-            <a:p>
-              <a:pPr defTabSz="685783"/>
-              <a:r>
-                <a:rPr lang="en-US" sz="2000" dirty="0" err="1">
-                  <a:solidFill>
-                    <a:schemeClr val="tx1">
-                      <a:lumMod val="75000"/>
-                    </a:schemeClr>
-                  </a:solidFill>
-                  <a:latin typeface="Source Sans Pro Light" charset="0"/>
-                  <a:ea typeface="Source Sans Pro Light" charset="0"/>
-                  <a:cs typeface="Source Sans Pro Light" charset="0"/>
-                </a:rPr>
-                <a:t>MicroEJ</a:t>
-              </a:r>
-              <a:r>
-                <a:rPr lang="en-US" sz="2000" dirty="0">
-                  <a:solidFill>
-                    <a:schemeClr val="tx1">
-                      <a:lumMod val="75000"/>
-                    </a:schemeClr>
-                  </a:solidFill>
-                  <a:latin typeface="Source Sans Pro Light" charset="0"/>
-                  <a:ea typeface="Source Sans Pro Light" charset="0"/>
-                  <a:cs typeface="Source Sans Pro Light" charset="0"/>
-                </a:rPr>
-                <a:t> </a:t>
-              </a:r>
-              <a:r>
-                <a:rPr lang="en-US" sz="2000" dirty="0" smtClean="0">
-                  <a:solidFill>
-                    <a:schemeClr val="tx1">
-                      <a:lumMod val="75000"/>
-                    </a:schemeClr>
-                  </a:solidFill>
-                  <a:latin typeface="Source Sans Pro Light" charset="0"/>
-                  <a:ea typeface="Source Sans Pro Light" charset="0"/>
-                  <a:cs typeface="Source Sans Pro Light" charset="0"/>
-                </a:rPr>
-                <a:t/>
-              </a:r>
-              <a:br>
-                <a:rPr lang="en-US" sz="2000" dirty="0" smtClean="0">
-                  <a:solidFill>
-                    <a:schemeClr val="tx1">
-                      <a:lumMod val="75000"/>
-                    </a:schemeClr>
-                  </a:solidFill>
-                  <a:latin typeface="Source Sans Pro Light" charset="0"/>
-                  <a:ea typeface="Source Sans Pro Light" charset="0"/>
-                  <a:cs typeface="Source Sans Pro Light" charset="0"/>
-                </a:rPr>
-              </a:br>
-              <a:r>
-                <a:rPr lang="en-US" sz="2000" dirty="0" smtClean="0">
-                  <a:solidFill>
-                    <a:schemeClr val="tx1">
-                      <a:lumMod val="75000"/>
-                    </a:schemeClr>
-                  </a:solidFill>
-                  <a:latin typeface="Source Sans Pro Light" charset="0"/>
-                  <a:ea typeface="Source Sans Pro Light" charset="0"/>
-                  <a:cs typeface="Source Sans Pro Light" charset="0"/>
-                </a:rPr>
-                <a:t>Firmware </a:t>
-              </a:r>
-              <a:br>
-                <a:rPr lang="en-US" sz="2000" dirty="0" smtClean="0">
-                  <a:solidFill>
-                    <a:schemeClr val="tx1">
-                      <a:lumMod val="75000"/>
-                    </a:schemeClr>
-                  </a:solidFill>
-                  <a:latin typeface="Source Sans Pro Light" charset="0"/>
-                  <a:ea typeface="Source Sans Pro Light" charset="0"/>
-                  <a:cs typeface="Source Sans Pro Light" charset="0"/>
-                </a:rPr>
-              </a:br>
-              <a:r>
-                <a:rPr lang="en-US" sz="2000" dirty="0" smtClean="0">
-                  <a:solidFill>
-                    <a:schemeClr val="tx1">
-                      <a:lumMod val="75000"/>
-                    </a:schemeClr>
-                  </a:solidFill>
-                  <a:latin typeface="Source Sans Pro Light" charset="0"/>
-                  <a:ea typeface="Source Sans Pro Light" charset="0"/>
-                  <a:cs typeface="Source Sans Pro Light" charset="0"/>
-                </a:rPr>
-                <a:t>(</a:t>
-              </a:r>
-              <a:r>
-                <a:rPr lang="en-US" sz="2000" dirty="0">
-                  <a:solidFill>
-                    <a:schemeClr val="tx1">
-                      <a:lumMod val="75000"/>
-                    </a:schemeClr>
-                  </a:solidFill>
-                  <a:latin typeface="Source Sans Pro Light" charset="0"/>
-                  <a:ea typeface="Source Sans Pro Light" charset="0"/>
-                  <a:cs typeface="Source Sans Pro Light" charset="0"/>
-                </a:rPr>
-                <a:t>binary)</a:t>
-              </a:r>
-            </a:p>
-          </p:txBody>
-        </p:sp>
-        <p:sp>
-          <p:nvSpPr>
-            <p:cNvPr id="51" name="TextBox 37"/>
-            <p:cNvSpPr txBox="1"/>
-            <p:nvPr/>
-          </p:nvSpPr>
-          <p:spPr>
-            <a:xfrm>
-              <a:off x="6859239" y="5684810"/>
-              <a:ext cx="906017" cy="287130"/>
+              <a:off x="1152409" y="1656462"/>
+              <a:ext cx="782587" cy="369332"/>
             </a:xfrm>
             <a:prstGeom prst="rect">
               <a:avLst/>
@@ -4870,66 +5264,7 @@
             </a:bodyPr>
             <a:lstStyle/>
             <a:p>
-              <a:pPr algn="ctr">
-                <a:lnSpc>
-                  <a:spcPts val="1400"/>
-                </a:lnSpc>
-              </a:pPr>
-              <a:r>
-                <a:rPr lang="en-US" dirty="0">
-                  <a:solidFill>
-                    <a:schemeClr val="accent1"/>
-                  </a:solidFill>
-                  <a:latin typeface="Source Sans Pro" charset="0"/>
-                  <a:ea typeface="Source Sans Pro" charset="0"/>
-                  <a:cs typeface="Source Sans Pro" charset="0"/>
-                </a:rPr>
-                <a:t>Publish</a:t>
-              </a:r>
-              <a:endParaRPr lang="en-US" dirty="0">
-                <a:solidFill>
-                  <a:schemeClr val="accent1"/>
-                </a:solidFill>
-                <a:latin typeface="Source Sans Pro" charset="0"/>
-                <a:ea typeface="Source Sans Pro" charset="0"/>
-                <a:cs typeface="Source Sans Pro" charset="0"/>
-              </a:endParaRPr>
-            </a:p>
-          </p:txBody>
-        </p:sp>
-        <p:sp>
-          <p:nvSpPr>
-            <p:cNvPr id="52" name="TextBox 37"/>
-            <p:cNvSpPr txBox="1"/>
-            <p:nvPr/>
-          </p:nvSpPr>
-          <p:spPr>
-            <a:xfrm>
-              <a:off x="6882483" y="3184222"/>
-              <a:ext cx="859531" cy="556434"/>
-            </a:xfrm>
-            <a:prstGeom prst="rect">
-              <a:avLst/>
-            </a:prstGeom>
-            <a:noFill/>
-          </p:spPr>
-          <p:txBody>
-            <a:bodyPr wrap="none" rtlCol="0">
-              <a:spAutoFit/>
-            </a:bodyPr>
-            <a:lstStyle/>
-            <a:p>
-              <a:pPr algn="ctr">
-                <a:lnSpc>
-                  <a:spcPts val="1800"/>
-                </a:lnSpc>
-                <a:spcBef>
-                  <a:spcPts val="600"/>
-                </a:spcBef>
-                <a:spcAft>
-                  <a:spcPts val="600"/>
-                </a:spcAft>
-              </a:pPr>
+              <a:pPr algn="ctr"/>
               <a:r>
                 <a:rPr lang="en-US" dirty="0" smtClean="0">
                   <a:solidFill>
@@ -4939,39 +5274,7 @@
                   <a:ea typeface="Source Sans Pro" charset="0"/>
                   <a:cs typeface="Source Sans Pro" charset="0"/>
                 </a:rPr>
-                <a:t>Local </a:t>
-              </a:r>
-              <a:r>
-                <a:rPr lang="en-US" dirty="0" smtClean="0">
-                  <a:solidFill>
-                    <a:schemeClr val="accent1"/>
-                  </a:solidFill>
-                  <a:latin typeface="Source Sans Pro" charset="0"/>
-                  <a:ea typeface="Source Sans Pro" charset="0"/>
-                  <a:cs typeface="Source Sans Pro" charset="0"/>
-                </a:rPr>
-                <a:t/>
-              </a:r>
-              <a:br>
-                <a:rPr lang="en-US" dirty="0" smtClean="0">
-                  <a:solidFill>
-                    <a:schemeClr val="accent1"/>
-                  </a:solidFill>
-                  <a:latin typeface="Source Sans Pro" charset="0"/>
-                  <a:ea typeface="Source Sans Pro" charset="0"/>
-                  <a:cs typeface="Source Sans Pro" charset="0"/>
-                </a:rPr>
-              </a:br>
-              <a:r>
-                <a:rPr lang="en-US" dirty="0" smtClean="0">
-                  <a:solidFill>
-                    <a:schemeClr val="accent1"/>
-                  </a:solidFill>
-                  <a:latin typeface="Source Sans Pro" charset="0"/>
-                  <a:ea typeface="Source Sans Pro" charset="0"/>
-                  <a:cs typeface="Source Sans Pro" charset="0"/>
-                </a:rPr>
-                <a:t>Deploy</a:t>
+                <a:t>Install</a:t>
               </a:r>
               <a:endParaRPr lang="en-US" dirty="0">
                 <a:solidFill>
@@ -4984,674 +5287,16 @@
             </a:p>
           </p:txBody>
         </p:sp>
-        <p:sp>
-          <p:nvSpPr>
-            <p:cNvPr id="60" name="TextBox 59"/>
-            <p:cNvSpPr txBox="1"/>
-            <p:nvPr/>
-          </p:nvSpPr>
-          <p:spPr>
-            <a:xfrm>
-              <a:off x="8023423" y="3140299"/>
-              <a:ext cx="946808" cy="411257"/>
-            </a:xfrm>
-            <a:prstGeom prst="rect">
-              <a:avLst/>
-            </a:prstGeom>
-            <a:solidFill>
-              <a:schemeClr val="bg1"/>
-            </a:solidFill>
-          </p:spPr>
-          <p:txBody>
-            <a:bodyPr wrap="square" tIns="36000" bIns="36000" rtlCol="0">
-              <a:spAutoFit/>
-            </a:bodyPr>
-            <a:lstStyle/>
-            <a:p>
-              <a:pPr algn="ctr" defTabSz="685783">
-                <a:buClrTx/>
-              </a:pPr>
-              <a:r>
-                <a:rPr lang="en-US" sz="2200" dirty="0" smtClean="0">
-                  <a:solidFill>
-                    <a:schemeClr val="tx1">
-                      <a:lumMod val="75000"/>
-                    </a:schemeClr>
-                  </a:solidFill>
-                  <a:latin typeface="Source Sans Pro Light" charset="0"/>
-                  <a:ea typeface="Source Sans Pro Light" charset="0"/>
-                  <a:cs typeface="Source Sans Pro Light" charset="0"/>
-                </a:rPr>
-                <a:t>Target</a:t>
-              </a:r>
-              <a:endParaRPr lang="en-US" sz="2200" dirty="0">
-                <a:solidFill>
-                  <a:schemeClr val="tx1">
-                    <a:lumMod val="75000"/>
-                  </a:schemeClr>
-                </a:solidFill>
-                <a:latin typeface="Source Sans Pro Light" charset="0"/>
-                <a:ea typeface="Source Sans Pro Light" charset="0"/>
-                <a:cs typeface="Source Sans Pro Light" charset="0"/>
-              </a:endParaRPr>
-            </a:p>
-          </p:txBody>
-        </p:sp>
-        <p:pic>
-          <p:nvPicPr>
-            <p:cNvPr id="68" name="Picture 67"/>
-            <p:cNvPicPr>
-              <a:picLocks noChangeAspect="1"/>
-            </p:cNvPicPr>
-            <p:nvPr/>
-          </p:nvPicPr>
-          <p:blipFill>
-            <a:blip r:embed="rId2">
-              <a:extLst>
-                <a:ext uri="{28A0092B-C50C-407E-A947-70E740481C1C}">
-                  <a14:useLocalDpi xmlns:a14="http://schemas.microsoft.com/office/drawing/2010/main" val="0"/>
-                </a:ext>
-              </a:extLst>
-            </a:blip>
-            <a:stretch>
-              <a:fillRect/>
-            </a:stretch>
-          </p:blipFill>
-          <p:spPr>
-            <a:xfrm>
-              <a:off x="1113762" y="418154"/>
-              <a:ext cx="1228825" cy="1228823"/>
-            </a:xfrm>
-            <a:prstGeom prst="rect">
-              <a:avLst/>
-            </a:prstGeom>
-          </p:spPr>
-        </p:pic>
-        <p:pic>
-          <p:nvPicPr>
-            <p:cNvPr id="69" name="Picture 68"/>
-            <p:cNvPicPr>
-              <a:picLocks noChangeAspect="1"/>
-            </p:cNvPicPr>
-            <p:nvPr/>
-          </p:nvPicPr>
-          <p:blipFill>
-            <a:blip r:embed="rId3">
-              <a:extLst>
-                <a:ext uri="{28A0092B-C50C-407E-A947-70E740481C1C}">
-                  <a14:useLocalDpi xmlns:a14="http://schemas.microsoft.com/office/drawing/2010/main" val="0"/>
-                </a:ext>
-              </a:extLst>
-            </a:blip>
-            <a:stretch>
-              <a:fillRect/>
-            </a:stretch>
-          </p:blipFill>
-          <p:spPr>
-            <a:xfrm rot="14400000">
-              <a:off x="3797192" y="793399"/>
-              <a:ext cx="1417466" cy="772518"/>
-            </a:xfrm>
-            <a:prstGeom prst="rect">
-              <a:avLst/>
-            </a:prstGeom>
-          </p:spPr>
-        </p:pic>
-        <p:grpSp>
-          <p:nvGrpSpPr>
-            <p:cNvPr id="177" name="Group 176"/>
-            <p:cNvGrpSpPr/>
-            <p:nvPr/>
-          </p:nvGrpSpPr>
-          <p:grpSpPr>
-            <a:xfrm>
-              <a:off x="2764502" y="1988840"/>
-              <a:ext cx="2527697" cy="3356292"/>
-              <a:chOff x="3080191" y="2424803"/>
-              <a:chExt cx="1799086" cy="2388838"/>
-            </a:xfrm>
-          </p:grpSpPr>
-          <p:grpSp>
-            <p:nvGrpSpPr>
-              <p:cNvPr id="174" name="Group 173"/>
-              <p:cNvGrpSpPr/>
-              <p:nvPr/>
-            </p:nvGrpSpPr>
-            <p:grpSpPr>
-              <a:xfrm>
-                <a:off x="3080191" y="2424803"/>
-                <a:ext cx="1799086" cy="2388838"/>
-                <a:chOff x="8498011" y="1260355"/>
-                <a:chExt cx="1673582" cy="2222193"/>
-              </a:xfrm>
-            </p:grpSpPr>
-            <p:pic>
-              <p:nvPicPr>
-                <p:cNvPr id="175" name="Picture 174"/>
-                <p:cNvPicPr>
-                  <a:picLocks noChangeAspect="1"/>
-                </p:cNvPicPr>
-                <p:nvPr/>
-              </p:nvPicPr>
-              <p:blipFill rotWithShape="1">
-                <a:blip r:embed="rId4" cstate="print">
-                  <a:extLst>
-                    <a:ext uri="{28A0092B-C50C-407E-A947-70E740481C1C}">
-                      <a14:useLocalDpi xmlns:a14="http://schemas.microsoft.com/office/drawing/2010/main" val="0"/>
-                    </a:ext>
-                  </a:extLst>
-                </a:blip>
-                <a:srcRect l="18934" r="18934"/>
-                <a:stretch/>
-              </p:blipFill>
-              <p:spPr>
-                <a:xfrm>
-                  <a:off x="8498011" y="1260355"/>
-                  <a:ext cx="1673582" cy="2222193"/>
-                </a:xfrm>
-                <a:prstGeom prst="rect">
-                  <a:avLst/>
-                </a:prstGeom>
-              </p:spPr>
-            </p:pic>
-            <p:pic>
-              <p:nvPicPr>
-                <p:cNvPr id="176" name="Picture 175"/>
-                <p:cNvPicPr>
-                  <a:picLocks noChangeAspect="1"/>
-                </p:cNvPicPr>
-                <p:nvPr/>
-              </p:nvPicPr>
-              <p:blipFill>
-                <a:blip r:embed="rId5">
-                  <a:extLst>
-                    <a:ext uri="{28A0092B-C50C-407E-A947-70E740481C1C}">
-                      <a14:useLocalDpi xmlns:a14="http://schemas.microsoft.com/office/drawing/2010/main" val="0"/>
-                    </a:ext>
-                  </a:extLst>
-                </a:blip>
-                <a:stretch>
-                  <a:fillRect/>
-                </a:stretch>
-              </p:blipFill>
-              <p:spPr>
-                <a:xfrm rot="14400000">
-                  <a:off x="8997932" y="1799769"/>
-                  <a:ext cx="1201542" cy="654841"/>
-                </a:xfrm>
-                <a:prstGeom prst="rect">
-                  <a:avLst/>
-                </a:prstGeom>
-              </p:spPr>
-            </p:pic>
-          </p:grpSp>
-          <p:grpSp>
-            <p:nvGrpSpPr>
-              <p:cNvPr id="6" name="Group 5"/>
-              <p:cNvGrpSpPr/>
-              <p:nvPr/>
-            </p:nvGrpSpPr>
-            <p:grpSpPr>
-              <a:xfrm>
-                <a:off x="3535078" y="2619282"/>
-                <a:ext cx="303937" cy="314286"/>
-                <a:chOff x="2464217" y="2519136"/>
-                <a:chExt cx="618701" cy="639769"/>
-              </a:xfrm>
-            </p:grpSpPr>
-            <p:sp>
-              <p:nvSpPr>
-                <p:cNvPr id="92" name="Rectangle 91"/>
-                <p:cNvSpPr/>
-                <p:nvPr/>
-              </p:nvSpPr>
-              <p:spPr>
-                <a:xfrm>
-                  <a:off x="2464217" y="2519136"/>
-                  <a:ext cx="618701" cy="639769"/>
-                </a:xfrm>
-                <a:prstGeom prst="rect">
-                  <a:avLst/>
-                </a:prstGeom>
-                <a:solidFill>
-                  <a:schemeClr val="bg1"/>
-                </a:solidFill>
-                <a:ln>
-                  <a:noFill/>
-                </a:ln>
-                <a:scene3d>
-                  <a:camera prst="isometricLeftDown"/>
-                  <a:lightRig rig="threePt" dir="t"/>
-                </a:scene3d>
-              </p:spPr>
-              <p:style>
-                <a:lnRef idx="2">
-                  <a:schemeClr val="accent1">
-                    <a:shade val="50000"/>
-                  </a:schemeClr>
-                </a:lnRef>
-                <a:fillRef idx="1">
-                  <a:schemeClr val="accent1"/>
-                </a:fillRef>
-                <a:effectRef idx="0">
-                  <a:schemeClr val="accent1"/>
-                </a:effectRef>
-                <a:fontRef idx="minor">
-                  <a:schemeClr val="lt1"/>
-                </a:fontRef>
-              </p:style>
-              <p:txBody>
-                <a:bodyPr rtlCol="0" anchor="ctr"/>
-                <a:lstStyle/>
-                <a:p>
-                  <a:pPr algn="ctr"/>
-                  <a:r>
-                    <a:rPr lang="en-US" smtClean="0"/>
-                    <a:t>v</a:t>
-                  </a:r>
-                  <a:endParaRPr lang="en-US"/>
-                </a:p>
-              </p:txBody>
-            </p:sp>
-            <p:pic>
-              <p:nvPicPr>
-                <p:cNvPr id="93" name="Picture 92"/>
-                <p:cNvPicPr>
-                  <a:picLocks noChangeAspect="1"/>
-                </p:cNvPicPr>
-                <p:nvPr/>
-              </p:nvPicPr>
-              <p:blipFill>
-                <a:blip r:embed="rId2">
-                  <a:extLst>
-                    <a:ext uri="{28A0092B-C50C-407E-A947-70E740481C1C}">
-                      <a14:useLocalDpi xmlns:a14="http://schemas.microsoft.com/office/drawing/2010/main" val="0"/>
-                    </a:ext>
-                  </a:extLst>
-                </a:blip>
-                <a:stretch>
-                  <a:fillRect/>
-                </a:stretch>
-              </p:blipFill>
-              <p:spPr>
-                <a:xfrm>
-                  <a:off x="2515027" y="2575985"/>
-                  <a:ext cx="509063" cy="559968"/>
-                </a:xfrm>
-                <a:prstGeom prst="rect">
-                  <a:avLst/>
-                </a:prstGeom>
-                <a:scene3d>
-                  <a:camera prst="isometricLeftDown"/>
-                  <a:lightRig rig="threePt" dir="t"/>
-                </a:scene3d>
-              </p:spPr>
-            </p:pic>
-          </p:grpSp>
-        </p:grpSp>
-        <p:sp>
-          <p:nvSpPr>
-            <p:cNvPr id="95" name="TextBox 94"/>
-            <p:cNvSpPr txBox="1"/>
-            <p:nvPr/>
-          </p:nvSpPr>
-          <p:spPr>
-            <a:xfrm>
-              <a:off x="1121755" y="3014243"/>
-              <a:ext cx="2179553" cy="411257"/>
-            </a:xfrm>
-            <a:prstGeom prst="rect">
-              <a:avLst/>
-            </a:prstGeom>
-            <a:solidFill>
-              <a:schemeClr val="bg1"/>
-            </a:solidFill>
-          </p:spPr>
-          <p:txBody>
-            <a:bodyPr wrap="square" tIns="36000" bIns="36000" rtlCol="0">
-              <a:spAutoFit/>
-            </a:bodyPr>
-            <a:lstStyle/>
-            <a:p>
-              <a:pPr algn="ctr" defTabSz="685783">
-                <a:buClrTx/>
-              </a:pPr>
-              <a:r>
-                <a:rPr lang="en-US" sz="2200" dirty="0" smtClean="0">
-                  <a:solidFill>
-                    <a:schemeClr val="tx1">
-                      <a:lumMod val="75000"/>
-                    </a:schemeClr>
-                  </a:solidFill>
-                  <a:latin typeface="Source Sans Pro Light" charset="0"/>
-                  <a:ea typeface="Source Sans Pro Light" charset="0"/>
-                  <a:cs typeface="Source Sans Pro Light" charset="0"/>
-                </a:rPr>
-                <a:t>Your Workstation</a:t>
-              </a:r>
-              <a:endParaRPr lang="en-US" sz="2200" dirty="0">
-                <a:solidFill>
-                  <a:schemeClr val="tx1">
-                    <a:lumMod val="75000"/>
-                  </a:schemeClr>
-                </a:solidFill>
-                <a:latin typeface="Source Sans Pro Light" charset="0"/>
-                <a:ea typeface="Source Sans Pro Light" charset="0"/>
-                <a:cs typeface="Source Sans Pro Light" charset="0"/>
-              </a:endParaRPr>
-            </a:p>
-          </p:txBody>
-        </p:sp>
-        <p:sp>
-          <p:nvSpPr>
-            <p:cNvPr id="96" name="TextBox 21"/>
-            <p:cNvSpPr txBox="1"/>
-            <p:nvPr/>
-          </p:nvSpPr>
-          <p:spPr>
-            <a:xfrm>
-              <a:off x="2443589" y="843569"/>
-              <a:ext cx="1402085" cy="707886"/>
-            </a:xfrm>
-            <a:prstGeom prst="rect">
-              <a:avLst/>
-            </a:prstGeom>
-            <a:noFill/>
-          </p:spPr>
-          <p:txBody>
-            <a:bodyPr wrap="square" rtlCol="0">
-              <a:spAutoFit/>
-            </a:bodyPr>
-            <a:lstStyle/>
-            <a:p>
-              <a:pPr defTabSz="685783"/>
-              <a:r>
-                <a:rPr lang="en-US" sz="2000" dirty="0">
-                  <a:solidFill>
-                    <a:schemeClr val="tx1">
-                      <a:lumMod val="75000"/>
-                    </a:schemeClr>
-                  </a:solidFill>
-                  <a:latin typeface="Source Sans Pro Light" charset="0"/>
-                  <a:ea typeface="Source Sans Pro Light" charset="0"/>
-                  <a:cs typeface="Source Sans Pro Light" charset="0"/>
-                </a:rPr>
-                <a:t>Software </a:t>
-              </a:r>
-              <a:r>
-                <a:rPr lang="en-US" sz="2000" dirty="0" smtClean="0">
-                  <a:solidFill>
-                    <a:schemeClr val="tx1">
-                      <a:lumMod val="75000"/>
-                    </a:schemeClr>
-                  </a:solidFill>
-                  <a:latin typeface="Source Sans Pro Light" charset="0"/>
-                  <a:ea typeface="Source Sans Pro Light" charset="0"/>
-                  <a:cs typeface="Source Sans Pro Light" charset="0"/>
-                </a:rPr>
-                <a:t/>
-              </a:r>
-              <a:br>
-                <a:rPr lang="en-US" sz="2000" dirty="0" smtClean="0">
-                  <a:solidFill>
-                    <a:schemeClr val="tx1">
-                      <a:lumMod val="75000"/>
-                    </a:schemeClr>
-                  </a:solidFill>
-                  <a:latin typeface="Source Sans Pro Light" charset="0"/>
-                  <a:ea typeface="Source Sans Pro Light" charset="0"/>
-                  <a:cs typeface="Source Sans Pro Light" charset="0"/>
-                </a:rPr>
-              </a:br>
-              <a:r>
-                <a:rPr lang="en-US" sz="2000" dirty="0" smtClean="0">
-                  <a:solidFill>
-                    <a:schemeClr val="tx1">
-                      <a:lumMod val="75000"/>
-                    </a:schemeClr>
-                  </a:solidFill>
-                  <a:latin typeface="Source Sans Pro Light" charset="0"/>
-                  <a:ea typeface="Source Sans Pro Light" charset="0"/>
-                  <a:cs typeface="Source Sans Pro Light" charset="0"/>
-                </a:rPr>
-                <a:t>(.</a:t>
-              </a:r>
-              <a:r>
-                <a:rPr lang="en-US" sz="2000" dirty="0">
-                  <a:solidFill>
-                    <a:schemeClr val="tx1">
-                      <a:lumMod val="75000"/>
-                    </a:schemeClr>
-                  </a:solidFill>
-                  <a:latin typeface="Source Sans Pro Light" charset="0"/>
-                  <a:ea typeface="Source Sans Pro Light" charset="0"/>
-                  <a:cs typeface="Source Sans Pro Light" charset="0"/>
-                </a:rPr>
-                <a:t>exe)</a:t>
-              </a:r>
-            </a:p>
-          </p:txBody>
-        </p:sp>
-        <p:sp>
-          <p:nvSpPr>
-            <p:cNvPr id="97" name="TextBox 21"/>
-            <p:cNvSpPr txBox="1"/>
-            <p:nvPr/>
-          </p:nvSpPr>
-          <p:spPr>
-            <a:xfrm>
-              <a:off x="5102241" y="661705"/>
-              <a:ext cx="1759230" cy="1015663"/>
-            </a:xfrm>
-            <a:prstGeom prst="rect">
-              <a:avLst/>
-            </a:prstGeom>
-            <a:noFill/>
-          </p:spPr>
-          <p:txBody>
-            <a:bodyPr wrap="square" rtlCol="0">
-              <a:spAutoFit/>
-            </a:bodyPr>
-            <a:lstStyle/>
-            <a:p>
-              <a:pPr defTabSz="685783"/>
-              <a:r>
-                <a:rPr lang="en-US" sz="2000" dirty="0" err="1">
-                  <a:solidFill>
-                    <a:schemeClr val="tx1">
-                      <a:lumMod val="75000"/>
-                    </a:schemeClr>
-                  </a:solidFill>
-                  <a:latin typeface="Source Sans Pro Light" charset="0"/>
-                  <a:ea typeface="Source Sans Pro Light" charset="0"/>
-                  <a:cs typeface="Source Sans Pro Light" charset="0"/>
-                </a:rPr>
-                <a:t>MicroEJ</a:t>
-              </a:r>
-              <a:r>
-                <a:rPr lang="en-US" sz="2000" dirty="0">
-                  <a:solidFill>
-                    <a:schemeClr val="tx1">
-                      <a:lumMod val="75000"/>
-                    </a:schemeClr>
-                  </a:solidFill>
-                  <a:latin typeface="Source Sans Pro Light" charset="0"/>
-                  <a:ea typeface="Source Sans Pro Light" charset="0"/>
-                  <a:cs typeface="Source Sans Pro Light" charset="0"/>
-                </a:rPr>
-                <a:t> </a:t>
-              </a:r>
-              <a:r>
-                <a:rPr lang="en-US" sz="2000" dirty="0" smtClean="0">
-                  <a:solidFill>
-                    <a:schemeClr val="tx1">
-                      <a:lumMod val="75000"/>
-                    </a:schemeClr>
-                  </a:solidFill>
-                  <a:latin typeface="Source Sans Pro Light" charset="0"/>
-                  <a:ea typeface="Source Sans Pro Light" charset="0"/>
-                  <a:cs typeface="Source Sans Pro Light" charset="0"/>
-                </a:rPr>
-                <a:t/>
-              </a:r>
-              <a:br>
-                <a:rPr lang="en-US" sz="2000" dirty="0" smtClean="0">
-                  <a:solidFill>
-                    <a:schemeClr val="tx1">
-                      <a:lumMod val="75000"/>
-                    </a:schemeClr>
-                  </a:solidFill>
-                  <a:latin typeface="Source Sans Pro Light" charset="0"/>
-                  <a:ea typeface="Source Sans Pro Light" charset="0"/>
-                  <a:cs typeface="Source Sans Pro Light" charset="0"/>
-                </a:rPr>
-              </a:br>
-              <a:r>
-                <a:rPr lang="en-US" sz="2000" dirty="0" smtClean="0">
-                  <a:solidFill>
-                    <a:schemeClr val="tx1">
-                      <a:lumMod val="75000"/>
-                    </a:schemeClr>
-                  </a:solidFill>
-                  <a:latin typeface="Source Sans Pro Light" charset="0"/>
-                  <a:ea typeface="Source Sans Pro Light" charset="0"/>
-                  <a:cs typeface="Source Sans Pro Light" charset="0"/>
-                </a:rPr>
-                <a:t>Virtual Device </a:t>
-              </a:r>
-              <a:r>
-                <a:rPr lang="en-US" sz="2000" dirty="0">
-                  <a:solidFill>
-                    <a:schemeClr val="tx1">
-                      <a:lumMod val="75000"/>
-                    </a:schemeClr>
-                  </a:solidFill>
-                  <a:latin typeface="Source Sans Pro Light" charset="0"/>
-                  <a:ea typeface="Source Sans Pro Light" charset="0"/>
-                  <a:cs typeface="Source Sans Pro Light" charset="0"/>
-                </a:rPr>
-                <a:t>(.</a:t>
-              </a:r>
-              <a:r>
-                <a:rPr lang="en-US" sz="2000" dirty="0" err="1">
-                  <a:solidFill>
-                    <a:schemeClr val="tx1">
-                      <a:lumMod val="75000"/>
-                    </a:schemeClr>
-                  </a:solidFill>
-                  <a:latin typeface="Source Sans Pro Light" charset="0"/>
-                  <a:ea typeface="Source Sans Pro Light" charset="0"/>
-                  <a:cs typeface="Source Sans Pro Light" charset="0"/>
-                </a:rPr>
-                <a:t>vde</a:t>
-              </a:r>
-              <a:r>
-                <a:rPr lang="en-US" sz="2000" dirty="0">
-                  <a:solidFill>
-                    <a:schemeClr val="tx1">
-                      <a:lumMod val="75000"/>
-                    </a:schemeClr>
-                  </a:solidFill>
-                  <a:latin typeface="Source Sans Pro Light" charset="0"/>
-                  <a:ea typeface="Source Sans Pro Light" charset="0"/>
-                  <a:cs typeface="Source Sans Pro Light" charset="0"/>
-                </a:rPr>
-                <a:t>)</a:t>
-              </a:r>
-            </a:p>
-          </p:txBody>
-        </p:sp>
-        <p:pic>
-          <p:nvPicPr>
-            <p:cNvPr id="100" name="Picture 99"/>
-            <p:cNvPicPr>
-              <a:picLocks noChangeAspect="1"/>
-            </p:cNvPicPr>
-            <p:nvPr/>
-          </p:nvPicPr>
-          <p:blipFill>
-            <a:blip r:embed="rId6" cstate="print">
-              <a:extLst>
-                <a:ext uri="{28A0092B-C50C-407E-A947-70E740481C1C}">
-                  <a14:useLocalDpi xmlns:a14="http://schemas.microsoft.com/office/drawing/2010/main" val="0"/>
-                </a:ext>
-              </a:extLst>
-            </a:blip>
-            <a:stretch>
-              <a:fillRect/>
-            </a:stretch>
-          </p:blipFill>
-          <p:spPr>
-            <a:xfrm>
-              <a:off x="8103016" y="670512"/>
-              <a:ext cx="1018295" cy="1018295"/>
-            </a:xfrm>
-            <a:prstGeom prst="rect">
-              <a:avLst/>
-            </a:prstGeom>
-          </p:spPr>
-        </p:pic>
-        <p:sp>
-          <p:nvSpPr>
-            <p:cNvPr id="101" name="TextBox 100"/>
-            <p:cNvSpPr txBox="1"/>
-            <p:nvPr/>
-          </p:nvSpPr>
-          <p:spPr>
-            <a:xfrm>
-              <a:off x="1055997" y="3394432"/>
-              <a:ext cx="2179553" cy="349702"/>
-            </a:xfrm>
-            <a:prstGeom prst="rect">
-              <a:avLst/>
-            </a:prstGeom>
-            <a:noFill/>
-          </p:spPr>
-          <p:txBody>
-            <a:bodyPr wrap="square" tIns="36000" bIns="36000" rtlCol="0">
-              <a:spAutoFit/>
-            </a:bodyPr>
-            <a:lstStyle/>
-            <a:p>
-              <a:pPr algn="ctr" defTabSz="685783">
-                <a:buClrTx/>
-              </a:pPr>
-              <a:r>
-                <a:rPr lang="en-US" dirty="0" smtClean="0">
-                  <a:solidFill>
-                    <a:schemeClr val="tx1">
-                      <a:lumMod val="75000"/>
-                    </a:schemeClr>
-                  </a:solidFill>
-                  <a:latin typeface="Source Sans Pro Light" charset="0"/>
-                  <a:ea typeface="Source Sans Pro Light" charset="0"/>
-                  <a:cs typeface="Source Sans Pro Light" charset="0"/>
-                </a:rPr>
-                <a:t>with Simulator</a:t>
-              </a:r>
-              <a:endParaRPr lang="en-US" dirty="0">
-                <a:solidFill>
-                  <a:schemeClr val="tx1">
-                    <a:lumMod val="75000"/>
-                  </a:schemeClr>
-                </a:solidFill>
-                <a:latin typeface="Source Sans Pro Light" charset="0"/>
-                <a:ea typeface="Source Sans Pro Light" charset="0"/>
-                <a:cs typeface="Source Sans Pro Light" charset="0"/>
-              </a:endParaRPr>
-            </a:p>
-          </p:txBody>
-        </p:sp>
         <p:cxnSp>
           <p:nvCxnSpPr>
-            <p:cNvPr id="17" name="Straight Arrow Connector 16"/>
+            <p:cNvPr id="25" name="Straight Arrow Connector 24"/>
             <p:cNvCxnSpPr/>
             <p:nvPr/>
           </p:nvCxnSpPr>
           <p:spPr>
             <a:xfrm>
-              <a:off x="7021449" y="3098413"/>
-              <a:ext cx="626794" cy="0"/>
+              <a:off x="1127448" y="1585249"/>
+              <a:ext cx="0" cy="573493"/>
             </a:xfrm>
             <a:prstGeom prst="straightConnector1">
               <a:avLst/>
@@ -5679,443 +5324,86 @@
             </a:fontRef>
           </p:style>
         </p:cxnSp>
-        <p:grpSp>
-          <p:nvGrpSpPr>
-            <p:cNvPr id="26" name="Group 25"/>
-            <p:cNvGrpSpPr/>
+      </p:grpSp>
+      <p:grpSp>
+        <p:nvGrpSpPr>
+          <p:cNvPr id="133" name="Group 132"/>
+          <p:cNvGrpSpPr/>
+          <p:nvPr/>
+        </p:nvGrpSpPr>
+        <p:grpSpPr>
+          <a:xfrm>
+            <a:off x="5323222" y="1480477"/>
+            <a:ext cx="848309" cy="573493"/>
+            <a:chOff x="1119548" y="1585249"/>
+            <a:chExt cx="848309" cy="573493"/>
+          </a:xfrm>
+        </p:grpSpPr>
+        <p:sp>
+          <p:nvSpPr>
+            <p:cNvPr id="134" name="TextBox 37"/>
+            <p:cNvSpPr txBox="1"/>
             <p:nvPr/>
-          </p:nvGrpSpPr>
-          <p:grpSpPr>
+          </p:nvSpPr>
+          <p:spPr>
             <a:xfrm>
-              <a:off x="2335416" y="1952616"/>
-              <a:ext cx="807548" cy="573493"/>
-              <a:chOff x="1127448" y="1585249"/>
-              <a:chExt cx="807548" cy="573493"/>
+              <a:off x="1119548" y="1656462"/>
+              <a:ext cx="848309" cy="369332"/>
             </a:xfrm>
-          </p:grpSpPr>
-          <p:sp>
-            <p:nvSpPr>
-              <p:cNvPr id="18" name="TextBox 37"/>
-              <p:cNvSpPr txBox="1"/>
-              <p:nvPr/>
-            </p:nvSpPr>
-            <p:spPr>
-              <a:xfrm>
-                <a:off x="1152409" y="1656462"/>
-                <a:ext cx="782587" cy="369332"/>
-              </a:xfrm>
-              <a:prstGeom prst="rect">
-                <a:avLst/>
-              </a:prstGeom>
-              <a:noFill/>
-            </p:spPr>
-            <p:txBody>
-              <a:bodyPr wrap="none" rtlCol="0">
-                <a:spAutoFit/>
-              </a:bodyPr>
-              <a:lstStyle/>
-              <a:p>
-                <a:pPr algn="ctr"/>
-                <a:r>
-                  <a:rPr lang="en-US" dirty="0" smtClean="0">
-                    <a:solidFill>
-                      <a:schemeClr val="accent1"/>
-                    </a:solidFill>
-                    <a:latin typeface="Source Sans Pro" charset="0"/>
-                    <a:ea typeface="Source Sans Pro" charset="0"/>
-                    <a:cs typeface="Source Sans Pro" charset="0"/>
-                  </a:rPr>
-                  <a:t>Install</a:t>
-                </a:r>
-                <a:endParaRPr lang="en-US" dirty="0">
+            <a:prstGeom prst="rect">
+              <a:avLst/>
+            </a:prstGeom>
+            <a:noFill/>
+          </p:spPr>
+          <p:txBody>
+            <a:bodyPr wrap="none" rtlCol="0">
+              <a:spAutoFit/>
+            </a:bodyPr>
+            <a:lstStyle/>
+            <a:p>
+              <a:pPr algn="ctr"/>
+              <a:r>
+                <a:rPr lang="en-US" dirty="0" smtClean="0">
                   <a:solidFill>
                     <a:schemeClr val="accent1"/>
                   </a:solidFill>
                   <a:latin typeface="Source Sans Pro" charset="0"/>
                   <a:ea typeface="Source Sans Pro" charset="0"/>
                   <a:cs typeface="Source Sans Pro" charset="0"/>
-                </a:endParaRPr>
-              </a:p>
-            </p:txBody>
-          </p:sp>
-          <p:cxnSp>
-            <p:nvCxnSpPr>
-              <p:cNvPr id="25" name="Straight Arrow Connector 24"/>
-              <p:cNvCxnSpPr/>
-              <p:nvPr/>
-            </p:nvCxnSpPr>
-            <p:spPr>
-              <a:xfrm>
-                <a:off x="1127448" y="1585249"/>
-                <a:ext cx="0" cy="573493"/>
-              </a:xfrm>
-              <a:prstGeom prst="straightConnector1">
-                <a:avLst/>
-              </a:prstGeom>
-              <a:ln w="28575">
+                </a:rPr>
+                <a:t>Import</a:t>
+              </a:r>
+              <a:endParaRPr lang="en-US" dirty="0">
                 <a:solidFill>
                   <a:schemeClr val="accent1"/>
                 </a:solidFill>
-                <a:headEnd type="none" w="med" len="med"/>
-                <a:tailEnd type="triangle" w="med" len="med"/>
-              </a:ln>
-            </p:spPr>
-            <p:style>
-              <a:lnRef idx="1">
-                <a:schemeClr val="accent1"/>
-              </a:lnRef>
-              <a:fillRef idx="0">
-                <a:schemeClr val="accent1"/>
-              </a:fillRef>
-              <a:effectRef idx="0">
-                <a:schemeClr val="accent1"/>
-              </a:effectRef>
-              <a:fontRef idx="minor">
-                <a:schemeClr val="tx1"/>
-              </a:fontRef>
-            </p:style>
-          </p:cxnSp>
-        </p:grpSp>
-        <p:grpSp>
-          <p:nvGrpSpPr>
-            <p:cNvPr id="133" name="Group 132"/>
-            <p:cNvGrpSpPr/>
-            <p:nvPr/>
-          </p:nvGrpSpPr>
-          <p:grpSpPr>
-            <a:xfrm>
-              <a:off x="5331122" y="1952616"/>
-              <a:ext cx="807548" cy="573493"/>
-              <a:chOff x="1127448" y="1585249"/>
-              <a:chExt cx="807548" cy="573493"/>
-            </a:xfrm>
-          </p:grpSpPr>
-          <p:sp>
-            <p:nvSpPr>
-              <p:cNvPr id="134" name="TextBox 37"/>
-              <p:cNvSpPr txBox="1"/>
-              <p:nvPr/>
-            </p:nvSpPr>
-            <p:spPr>
-              <a:xfrm>
-                <a:off x="1152409" y="1656462"/>
-                <a:ext cx="782587" cy="369332"/>
-              </a:xfrm>
-              <a:prstGeom prst="rect">
-                <a:avLst/>
-              </a:prstGeom>
-              <a:noFill/>
-            </p:spPr>
-            <p:txBody>
-              <a:bodyPr wrap="none" rtlCol="0">
-                <a:spAutoFit/>
-              </a:bodyPr>
-              <a:lstStyle/>
-              <a:p>
-                <a:pPr algn="ctr"/>
-                <a:r>
-                  <a:rPr lang="en-US" dirty="0" smtClean="0">
-                    <a:solidFill>
-                      <a:schemeClr val="accent1"/>
-                    </a:solidFill>
-                    <a:latin typeface="Source Sans Pro" charset="0"/>
-                    <a:ea typeface="Source Sans Pro" charset="0"/>
-                    <a:cs typeface="Source Sans Pro" charset="0"/>
-                  </a:rPr>
-                  <a:t>Install</a:t>
-                </a:r>
-                <a:endParaRPr lang="en-US" dirty="0">
-                  <a:solidFill>
-                    <a:schemeClr val="accent1"/>
-                  </a:solidFill>
-                  <a:latin typeface="Source Sans Pro" charset="0"/>
-                  <a:ea typeface="Source Sans Pro" charset="0"/>
-                  <a:cs typeface="Source Sans Pro" charset="0"/>
-                </a:endParaRPr>
-              </a:p>
-            </p:txBody>
-          </p:sp>
-          <p:cxnSp>
-            <p:nvCxnSpPr>
-              <p:cNvPr id="135" name="Straight Arrow Connector 134"/>
-              <p:cNvCxnSpPr/>
-              <p:nvPr/>
-            </p:nvCxnSpPr>
-            <p:spPr>
-              <a:xfrm>
-                <a:off x="1127448" y="1585249"/>
-                <a:ext cx="0" cy="573493"/>
-              </a:xfrm>
-              <a:prstGeom prst="straightConnector1">
-                <a:avLst/>
-              </a:prstGeom>
-              <a:ln w="28575">
-                <a:solidFill>
-                  <a:schemeClr val="accent1"/>
-                </a:solidFill>
-                <a:headEnd type="none" w="med" len="med"/>
-                <a:tailEnd type="triangle" w="med" len="med"/>
-              </a:ln>
-            </p:spPr>
-            <p:style>
-              <a:lnRef idx="1">
-                <a:schemeClr val="accent1"/>
-              </a:lnRef>
-              <a:fillRef idx="0">
-                <a:schemeClr val="accent1"/>
-              </a:fillRef>
-              <a:effectRef idx="0">
-                <a:schemeClr val="accent1"/>
-              </a:effectRef>
-              <a:fontRef idx="minor">
-                <a:schemeClr val="tx1"/>
-              </a:fontRef>
-            </p:style>
-          </p:cxnSp>
-        </p:grpSp>
-        <p:grpSp>
-          <p:nvGrpSpPr>
-            <p:cNvPr id="136" name="Group 135"/>
-            <p:cNvGrpSpPr/>
-            <p:nvPr/>
-          </p:nvGrpSpPr>
-          <p:grpSpPr>
-            <a:xfrm>
-              <a:off x="9347549" y="1952616"/>
-              <a:ext cx="764266" cy="573493"/>
-              <a:chOff x="1127448" y="1585249"/>
-              <a:chExt cx="764266" cy="573493"/>
-            </a:xfrm>
-          </p:grpSpPr>
-          <p:sp>
-            <p:nvSpPr>
-              <p:cNvPr id="137" name="TextBox 37"/>
-              <p:cNvSpPr txBox="1"/>
-              <p:nvPr/>
-            </p:nvSpPr>
-            <p:spPr>
-              <a:xfrm>
-                <a:off x="1195690" y="1656462"/>
-                <a:ext cx="696024" cy="369332"/>
-              </a:xfrm>
-              <a:prstGeom prst="rect">
-                <a:avLst/>
-              </a:prstGeom>
-              <a:noFill/>
-            </p:spPr>
-            <p:txBody>
-              <a:bodyPr wrap="none" rtlCol="0">
-                <a:spAutoFit/>
-              </a:bodyPr>
-              <a:lstStyle/>
-              <a:p>
-                <a:pPr algn="ctr"/>
-                <a:r>
-                  <a:rPr lang="en-US" dirty="0" smtClean="0">
-                    <a:solidFill>
-                      <a:schemeClr val="accent1"/>
-                    </a:solidFill>
-                    <a:latin typeface="Source Sans Pro" charset="0"/>
-                    <a:ea typeface="Source Sans Pro" charset="0"/>
-                    <a:cs typeface="Source Sans Pro" charset="0"/>
-                  </a:rPr>
-                  <a:t>Flash</a:t>
-                </a:r>
-                <a:endParaRPr lang="en-US" dirty="0">
-                  <a:solidFill>
-                    <a:schemeClr val="accent1"/>
-                  </a:solidFill>
-                  <a:latin typeface="Source Sans Pro" charset="0"/>
-                  <a:ea typeface="Source Sans Pro" charset="0"/>
-                  <a:cs typeface="Source Sans Pro" charset="0"/>
-                </a:endParaRPr>
-              </a:p>
-            </p:txBody>
-          </p:sp>
-          <p:cxnSp>
-            <p:nvCxnSpPr>
-              <p:cNvPr id="138" name="Straight Arrow Connector 137"/>
-              <p:cNvCxnSpPr/>
-              <p:nvPr/>
-            </p:nvCxnSpPr>
-            <p:spPr>
-              <a:xfrm>
-                <a:off x="1127448" y="1585249"/>
-                <a:ext cx="0" cy="573493"/>
-              </a:xfrm>
-              <a:prstGeom prst="straightConnector1">
-                <a:avLst/>
-              </a:prstGeom>
-              <a:ln w="28575">
-                <a:solidFill>
-                  <a:schemeClr val="accent1"/>
-                </a:solidFill>
-                <a:headEnd type="none" w="med" len="med"/>
-                <a:tailEnd type="triangle" w="med" len="med"/>
-              </a:ln>
-            </p:spPr>
-            <p:style>
-              <a:lnRef idx="1">
-                <a:schemeClr val="accent1"/>
-              </a:lnRef>
-              <a:fillRef idx="0">
-                <a:schemeClr val="accent1"/>
-              </a:fillRef>
-              <a:effectRef idx="0">
-                <a:schemeClr val="accent1"/>
-              </a:effectRef>
-              <a:fontRef idx="minor">
-                <a:schemeClr val="tx1"/>
-              </a:fontRef>
-            </p:style>
-          </p:cxnSp>
-        </p:grpSp>
-        <p:grpSp>
-          <p:nvGrpSpPr>
-            <p:cNvPr id="142" name="Group 141"/>
-            <p:cNvGrpSpPr/>
-            <p:nvPr/>
-          </p:nvGrpSpPr>
-          <p:grpSpPr>
-            <a:xfrm>
-              <a:off x="9347549" y="4173417"/>
-              <a:ext cx="1288448" cy="627647"/>
-              <a:chOff x="1127448" y="1585249"/>
-              <a:chExt cx="1288448" cy="627647"/>
-            </a:xfrm>
-          </p:grpSpPr>
-          <p:sp>
-            <p:nvSpPr>
-              <p:cNvPr id="143" name="TextBox 37"/>
-              <p:cNvSpPr txBox="1"/>
-              <p:nvPr/>
-            </p:nvSpPr>
-            <p:spPr>
-              <a:xfrm>
-                <a:off x="1195690" y="1656462"/>
-                <a:ext cx="1220206" cy="556434"/>
-              </a:xfrm>
-              <a:prstGeom prst="rect">
-                <a:avLst/>
-              </a:prstGeom>
-              <a:noFill/>
-            </p:spPr>
-            <p:txBody>
-              <a:bodyPr wrap="none" rtlCol="0">
-                <a:spAutoFit/>
-              </a:bodyPr>
-              <a:lstStyle/>
-              <a:p>
-                <a:pPr>
-                  <a:lnSpc>
-                    <a:spcPts val="1800"/>
-                  </a:lnSpc>
-                  <a:spcBef>
-                    <a:spcPts val="600"/>
-                  </a:spcBef>
-                  <a:spcAft>
-                    <a:spcPts val="600"/>
-                  </a:spcAft>
-                </a:pPr>
-                <a:r>
-                  <a:rPr lang="en-US">
-                    <a:solidFill>
-                      <a:schemeClr val="accent1"/>
-                    </a:solidFill>
-                    <a:latin typeface="Source Sans Pro" charset="0"/>
-                    <a:ea typeface="Source Sans Pro" charset="0"/>
-                    <a:cs typeface="Source Sans Pro" charset="0"/>
-                  </a:rPr>
-                  <a:t>Download </a:t>
-                </a:r>
-                <a:br>
-                  <a:rPr lang="en-US">
-                    <a:solidFill>
-                      <a:schemeClr val="accent1"/>
-                    </a:solidFill>
-                    <a:latin typeface="Source Sans Pro" charset="0"/>
-                    <a:ea typeface="Source Sans Pro" charset="0"/>
-                    <a:cs typeface="Source Sans Pro" charset="0"/>
-                  </a:rPr>
-                </a:br>
-                <a:r>
-                  <a:rPr lang="en-US">
-                    <a:solidFill>
-                      <a:schemeClr val="accent1"/>
-                    </a:solidFill>
-                    <a:latin typeface="Source Sans Pro" charset="0"/>
-                    <a:ea typeface="Source Sans Pro" charset="0"/>
-                    <a:cs typeface="Source Sans Pro" charset="0"/>
-                  </a:rPr>
-                  <a:t>&amp; Install</a:t>
-                </a:r>
-                <a:endParaRPr lang="en-US" dirty="0">
-                  <a:solidFill>
-                    <a:schemeClr val="accent1"/>
-                  </a:solidFill>
-                  <a:latin typeface="Source Sans Pro" charset="0"/>
-                  <a:ea typeface="Source Sans Pro" charset="0"/>
-                  <a:cs typeface="Source Sans Pro" charset="0"/>
-                </a:endParaRPr>
-              </a:p>
-            </p:txBody>
-          </p:sp>
-          <p:cxnSp>
-            <p:nvCxnSpPr>
-              <p:cNvPr id="144" name="Straight Arrow Connector 143"/>
-              <p:cNvCxnSpPr/>
-              <p:nvPr/>
-            </p:nvCxnSpPr>
-            <p:spPr>
-              <a:xfrm>
-                <a:off x="1127448" y="1585249"/>
-                <a:ext cx="0" cy="573493"/>
-              </a:xfrm>
-              <a:prstGeom prst="straightConnector1">
-                <a:avLst/>
-              </a:prstGeom>
-              <a:ln w="28575">
-                <a:solidFill>
-                  <a:schemeClr val="accent1"/>
-                </a:solidFill>
-                <a:headEnd type="none" w="med" len="med"/>
-                <a:tailEnd type="triangle" w="med" len="med"/>
-              </a:ln>
-            </p:spPr>
-            <p:style>
-              <a:lnRef idx="1">
-                <a:schemeClr val="accent1"/>
-              </a:lnRef>
-              <a:fillRef idx="0">
-                <a:schemeClr val="accent1"/>
-              </a:fillRef>
-              <a:effectRef idx="0">
-                <a:schemeClr val="accent1"/>
-              </a:effectRef>
-              <a:fontRef idx="minor">
-                <a:schemeClr val="tx1"/>
-              </a:fontRef>
-            </p:style>
-          </p:cxnSp>
-        </p:grpSp>
+                <a:latin typeface="Source Sans Pro" charset="0"/>
+                <a:ea typeface="Source Sans Pro" charset="0"/>
+                <a:cs typeface="Source Sans Pro" charset="0"/>
+              </a:endParaRPr>
+            </a:p>
+          </p:txBody>
+        </p:sp>
         <p:cxnSp>
           <p:nvCxnSpPr>
-            <p:cNvPr id="28" name="Elbow Connector 27"/>
+            <p:cNvPr id="135" name="Straight Arrow Connector 134"/>
             <p:cNvCxnSpPr/>
             <p:nvPr/>
           </p:nvCxnSpPr>
           <p:spPr>
             <a:xfrm>
-              <a:off x="5356083" y="4244630"/>
-              <a:ext cx="2282673" cy="1333834"/>
+              <a:off x="1127448" y="1585249"/>
+              <a:ext cx="0" cy="573493"/>
             </a:xfrm>
-            <a:prstGeom prst="bentConnector3">
-              <a:avLst>
-                <a:gd name="adj1" fmla="val 521"/>
-              </a:avLst>
+            <a:prstGeom prst="straightConnector1">
+              <a:avLst/>
             </a:prstGeom>
             <a:ln w="28575">
-              <a:tailEnd type="triangle"/>
+              <a:solidFill>
+                <a:schemeClr val="accent1"/>
+              </a:solidFill>
+              <a:headEnd type="none" w="med" len="med"/>
+              <a:tailEnd type="triangle" w="med" len="med"/>
             </a:ln>
           </p:spPr>
           <p:style>
@@ -6133,147 +5421,872 @@
             </a:fontRef>
           </p:style>
         </p:cxnSp>
+      </p:grpSp>
+      <p:grpSp>
+        <p:nvGrpSpPr>
+          <p:cNvPr id="142" name="Group 141"/>
+          <p:cNvGrpSpPr/>
+          <p:nvPr/>
+        </p:nvGrpSpPr>
+        <p:grpSpPr>
+          <a:xfrm>
+            <a:off x="9278017" y="3705120"/>
+            <a:ext cx="1288448" cy="627647"/>
+            <a:chOff x="1127448" y="1585249"/>
+            <a:chExt cx="1288448" cy="627647"/>
+          </a:xfrm>
+        </p:grpSpPr>
         <p:sp>
           <p:nvSpPr>
-            <p:cNvPr id="157" name="Rounded Rectangle 156"/>
-            <p:cNvSpPr/>
+            <p:cNvPr id="143" name="TextBox 37"/>
+            <p:cNvSpPr txBox="1"/>
             <p:nvPr/>
           </p:nvSpPr>
           <p:spPr>
             <a:xfrm>
-              <a:off x="7929652" y="4950848"/>
-              <a:ext cx="2835795" cy="1212313"/>
+              <a:off x="1195690" y="1656462"/>
+              <a:ext cx="1220206" cy="556434"/>
             </a:xfrm>
-            <a:prstGeom prst="roundRect">
-              <a:avLst>
-                <a:gd name="adj" fmla="val 15733"/>
-              </a:avLst>
+            <a:prstGeom prst="rect">
+              <a:avLst/>
             </a:prstGeom>
-            <a:solidFill>
-              <a:schemeClr val="bg1"/>
-            </a:solidFill>
-            <a:ln w="12700">
+            <a:noFill/>
+          </p:spPr>
+          <p:txBody>
+            <a:bodyPr wrap="none" rtlCol="0">
+              <a:spAutoFit/>
+            </a:bodyPr>
+            <a:lstStyle/>
+            <a:p>
+              <a:pPr>
+                <a:lnSpc>
+                  <a:spcPts val="1800"/>
+                </a:lnSpc>
+                <a:spcBef>
+                  <a:spcPts val="600"/>
+                </a:spcBef>
+                <a:spcAft>
+                  <a:spcPts val="600"/>
+                </a:spcAft>
+              </a:pPr>
+              <a:r>
+                <a:rPr lang="en-US">
+                  <a:solidFill>
+                    <a:schemeClr val="accent1"/>
+                  </a:solidFill>
+                  <a:latin typeface="Source Sans Pro" charset="0"/>
+                  <a:ea typeface="Source Sans Pro" charset="0"/>
+                  <a:cs typeface="Source Sans Pro" charset="0"/>
+                </a:rPr>
+                <a:t>Download </a:t>
+              </a:r>
+              <a:br>
+                <a:rPr lang="en-US">
+                  <a:solidFill>
+                    <a:schemeClr val="accent1"/>
+                  </a:solidFill>
+                  <a:latin typeface="Source Sans Pro" charset="0"/>
+                  <a:ea typeface="Source Sans Pro" charset="0"/>
+                  <a:cs typeface="Source Sans Pro" charset="0"/>
+                </a:rPr>
+              </a:br>
+              <a:r>
+                <a:rPr lang="en-US">
+                  <a:solidFill>
+                    <a:schemeClr val="accent1"/>
+                  </a:solidFill>
+                  <a:latin typeface="Source Sans Pro" charset="0"/>
+                  <a:ea typeface="Source Sans Pro" charset="0"/>
+                  <a:cs typeface="Source Sans Pro" charset="0"/>
+                </a:rPr>
+                <a:t>&amp; Install</a:t>
+              </a:r>
+              <a:endParaRPr lang="en-US" dirty="0">
+                <a:solidFill>
+                  <a:schemeClr val="accent1"/>
+                </a:solidFill>
+                <a:latin typeface="Source Sans Pro" charset="0"/>
+                <a:ea typeface="Source Sans Pro" charset="0"/>
+                <a:cs typeface="Source Sans Pro" charset="0"/>
+              </a:endParaRPr>
+            </a:p>
+          </p:txBody>
+        </p:sp>
+        <p:cxnSp>
+          <p:nvCxnSpPr>
+            <p:cNvPr id="144" name="Straight Arrow Connector 143"/>
+            <p:cNvCxnSpPr/>
+            <p:nvPr/>
+          </p:nvCxnSpPr>
+          <p:spPr>
+            <a:xfrm>
+              <a:off x="1127448" y="1585249"/>
+              <a:ext cx="0" cy="573493"/>
+            </a:xfrm>
+            <a:prstGeom prst="straightConnector1">
+              <a:avLst/>
+            </a:prstGeom>
+            <a:ln w="28575">
               <a:solidFill>
-                <a:schemeClr val="bg2"/>
+                <a:schemeClr val="accent1"/>
               </a:solidFill>
+              <a:headEnd type="none" w="med" len="med"/>
+              <a:tailEnd type="triangle" w="med" len="med"/>
             </a:ln>
           </p:spPr>
           <p:style>
-            <a:lnRef idx="2">
-              <a:schemeClr val="accent1">
-                <a:shade val="50000"/>
-              </a:schemeClr>
+            <a:lnRef idx="1">
+              <a:schemeClr val="accent1"/>
             </a:lnRef>
-            <a:fillRef idx="1">
+            <a:fillRef idx="0">
               <a:schemeClr val="accent1"/>
             </a:fillRef>
             <a:effectRef idx="0">
               <a:schemeClr val="accent1"/>
             </a:effectRef>
             <a:fontRef idx="minor">
-              <a:schemeClr val="lt1"/>
+              <a:schemeClr val="tx1"/>
             </a:fontRef>
           </p:style>
-          <p:txBody>
-            <a:bodyPr rtlCol="0" anchor="ctr"/>
-            <a:lstStyle/>
-            <a:p>
-              <a:pPr algn="ctr"/>
-              <a:endParaRPr lang="en-US" dirty="0"/>
-            </a:p>
-          </p:txBody>
-        </p:sp>
-        <p:pic>
-          <p:nvPicPr>
-            <p:cNvPr id="158" name="Picture 157"/>
-            <p:cNvPicPr>
-              <a:picLocks noChangeAspect="1"/>
-            </p:cNvPicPr>
-            <p:nvPr/>
-          </p:nvPicPr>
-          <p:blipFill>
-            <a:blip r:embed="rId7" cstate="print">
-              <a:extLst>
-                <a:ext uri="{28A0092B-C50C-407E-A947-70E740481C1C}">
-                  <a14:useLocalDpi xmlns:a14="http://schemas.microsoft.com/office/drawing/2010/main" val="0"/>
-                </a:ext>
-              </a:extLst>
-            </a:blip>
-            <a:stretch>
-              <a:fillRect/>
-            </a:stretch>
-          </p:blipFill>
-          <p:spPr>
-            <a:xfrm>
-              <a:off x="7715784" y="4935063"/>
-              <a:ext cx="1295510" cy="1325306"/>
-            </a:xfrm>
-            <a:prstGeom prst="rect">
-              <a:avLst/>
-            </a:prstGeom>
-          </p:spPr>
-        </p:pic>
-        <p:pic>
-          <p:nvPicPr>
-            <p:cNvPr id="159" name="Picture 158"/>
-            <p:cNvPicPr>
-              <a:picLocks noChangeAspect="1"/>
-            </p:cNvPicPr>
-            <p:nvPr/>
-          </p:nvPicPr>
-          <p:blipFill>
-            <a:blip r:embed="rId8" cstate="print">
-              <a:extLst>
-                <a:ext uri="{28A0092B-C50C-407E-A947-70E740481C1C}">
-                  <a14:useLocalDpi xmlns:a14="http://schemas.microsoft.com/office/drawing/2010/main" val="0"/>
-                </a:ext>
-              </a:extLst>
-            </a:blip>
-            <a:stretch>
-              <a:fillRect/>
-            </a:stretch>
-          </p:blipFill>
-          <p:spPr>
-            <a:xfrm>
-              <a:off x="8868158" y="5397780"/>
-              <a:ext cx="1863546" cy="346619"/>
-            </a:xfrm>
-            <a:prstGeom prst="rect">
-              <a:avLst/>
-            </a:prstGeom>
-          </p:spPr>
-        </p:pic>
-        <p:pic>
-          <p:nvPicPr>
-            <p:cNvPr id="180" name="Picture 179"/>
-            <p:cNvPicPr>
-              <a:picLocks noChangeAspect="1"/>
-            </p:cNvPicPr>
-            <p:nvPr/>
-          </p:nvPicPr>
-          <p:blipFill>
-            <a:blip r:embed="rId5">
-              <a:extLst>
-                <a:ext uri="{28A0092B-C50C-407E-A947-70E740481C1C}">
-                  <a14:useLocalDpi xmlns:a14="http://schemas.microsoft.com/office/drawing/2010/main" val="0"/>
-                </a:ext>
-              </a:extLst>
-            </a:blip>
-            <a:stretch>
-              <a:fillRect/>
-            </a:stretch>
-          </p:blipFill>
-          <p:spPr>
-            <a:xfrm>
-              <a:off x="8838482" y="2817648"/>
-              <a:ext cx="2018398" cy="1100028"/>
-            </a:xfrm>
-            <a:prstGeom prst="rect">
-              <a:avLst/>
-            </a:prstGeom>
-          </p:spPr>
-        </p:pic>
+        </p:cxnSp>
       </p:grpSp>
+      <p:sp>
+        <p:nvSpPr>
+          <p:cNvPr id="157" name="Rounded Rectangle 156"/>
+          <p:cNvSpPr/>
+          <p:nvPr/>
+        </p:nvSpPr>
+        <p:spPr>
+          <a:xfrm>
+            <a:off x="8223502" y="2271182"/>
+            <a:ext cx="2835795" cy="1212313"/>
+          </a:xfrm>
+          <a:prstGeom prst="roundRect">
+            <a:avLst>
+              <a:gd name="adj" fmla="val 15733"/>
+            </a:avLst>
+          </a:prstGeom>
+          <a:solidFill>
+            <a:schemeClr val="bg1"/>
+          </a:solidFill>
+          <a:ln w="12700">
+            <a:solidFill>
+              <a:schemeClr val="bg2"/>
+            </a:solidFill>
+          </a:ln>
+        </p:spPr>
+        <p:style>
+          <a:lnRef idx="2">
+            <a:schemeClr val="accent1">
+              <a:shade val="50000"/>
+            </a:schemeClr>
+          </a:lnRef>
+          <a:fillRef idx="1">
+            <a:schemeClr val="accent1"/>
+          </a:fillRef>
+          <a:effectRef idx="0">
+            <a:schemeClr val="accent1"/>
+          </a:effectRef>
+          <a:fontRef idx="minor">
+            <a:schemeClr val="lt1"/>
+          </a:fontRef>
+        </p:style>
+        <p:txBody>
+          <a:bodyPr rtlCol="0" anchor="ctr"/>
+          <a:lstStyle/>
+          <a:p>
+            <a:pPr algn="ctr"/>
+            <a:endParaRPr lang="en-US" dirty="0"/>
+          </a:p>
+        </p:txBody>
+      </p:sp>
+      <p:pic>
+        <p:nvPicPr>
+          <p:cNvPr id="158" name="Picture 157"/>
+          <p:cNvPicPr>
+            <a:picLocks noChangeAspect="1"/>
+          </p:cNvPicPr>
+          <p:nvPr/>
+        </p:nvPicPr>
+        <p:blipFill>
+          <a:blip r:embed="rId6" cstate="print">
+            <a:extLst>
+              <a:ext uri="{28A0092B-C50C-407E-A947-70E740481C1C}">
+                <a14:useLocalDpi xmlns:a14="http://schemas.microsoft.com/office/drawing/2010/main" val="0"/>
+              </a:ext>
+            </a:extLst>
+          </a:blip>
+          <a:stretch>
+            <a:fillRect/>
+          </a:stretch>
+        </p:blipFill>
+        <p:spPr>
+          <a:xfrm>
+            <a:off x="8009634" y="2255397"/>
+            <a:ext cx="1295510" cy="1325306"/>
+          </a:xfrm>
+          <a:prstGeom prst="rect">
+            <a:avLst/>
+          </a:prstGeom>
+        </p:spPr>
+      </p:pic>
+      <p:pic>
+        <p:nvPicPr>
+          <p:cNvPr id="159" name="Picture 158"/>
+          <p:cNvPicPr>
+            <a:picLocks noChangeAspect="1"/>
+          </p:cNvPicPr>
+          <p:nvPr/>
+        </p:nvPicPr>
+        <p:blipFill>
+          <a:blip r:embed="rId7" cstate="print">
+            <a:extLst>
+              <a:ext uri="{28A0092B-C50C-407E-A947-70E740481C1C}">
+                <a14:useLocalDpi xmlns:a14="http://schemas.microsoft.com/office/drawing/2010/main" val="0"/>
+              </a:ext>
+            </a:extLst>
+          </a:blip>
+          <a:stretch>
+            <a:fillRect/>
+          </a:stretch>
+        </p:blipFill>
+        <p:spPr>
+          <a:xfrm>
+            <a:off x="9162008" y="2718114"/>
+            <a:ext cx="1863546" cy="346619"/>
+          </a:xfrm>
+          <a:prstGeom prst="rect">
+            <a:avLst/>
+          </a:prstGeom>
+        </p:spPr>
+      </p:pic>
+      <p:pic>
+        <p:nvPicPr>
+          <p:cNvPr id="180" name="Picture 179"/>
+          <p:cNvPicPr>
+            <a:picLocks noChangeAspect="1"/>
+          </p:cNvPicPr>
+          <p:nvPr/>
+        </p:nvPicPr>
+        <p:blipFill>
+          <a:blip r:embed="rId8" cstate="print">
+            <a:extLst>
+              <a:ext uri="{28A0092B-C50C-407E-A947-70E740481C1C}">
+                <a14:useLocalDpi xmlns:a14="http://schemas.microsoft.com/office/drawing/2010/main" val="0"/>
+              </a:ext>
+            </a:extLst>
+          </a:blip>
+          <a:stretch>
+            <a:fillRect/>
+          </a:stretch>
+        </p:blipFill>
+        <p:spPr>
+          <a:xfrm>
+            <a:off x="8943516" y="4635700"/>
+            <a:ext cx="2116567" cy="1153530"/>
+          </a:xfrm>
+          <a:prstGeom prst="rect">
+            <a:avLst/>
+          </a:prstGeom>
+        </p:spPr>
+      </p:pic>
+      <p:pic>
+        <p:nvPicPr>
+          <p:cNvPr id="3" name="Picture 2"/>
+          <p:cNvPicPr>
+            <a:picLocks noChangeAspect="1"/>
+          </p:cNvPicPr>
+          <p:nvPr/>
+        </p:nvPicPr>
+        <p:blipFill>
+          <a:blip r:embed="rId9" cstate="print">
+            <a:extLst>
+              <a:ext uri="{28A0092B-C50C-407E-A947-70E740481C1C}">
+                <a14:useLocalDpi xmlns:a14="http://schemas.microsoft.com/office/drawing/2010/main" val="0"/>
+              </a:ext>
+            </a:extLst>
+          </a:blip>
+          <a:stretch>
+            <a:fillRect/>
+          </a:stretch>
+        </p:blipFill>
+        <p:spPr>
+          <a:xfrm>
+            <a:off x="1113001" y="178381"/>
+            <a:ext cx="1025714" cy="1025714"/>
+          </a:xfrm>
+          <a:prstGeom prst="rect">
+            <a:avLst/>
+          </a:prstGeom>
+        </p:spPr>
+      </p:pic>
+      <p:sp>
+        <p:nvSpPr>
+          <p:cNvPr id="47" name="TextBox 37"/>
+          <p:cNvSpPr txBox="1"/>
+          <p:nvPr/>
+        </p:nvSpPr>
+        <p:spPr>
+          <a:xfrm>
+            <a:off x="2155603" y="3659389"/>
+            <a:ext cx="567784" cy="369332"/>
+          </a:xfrm>
+          <a:prstGeom prst="rect">
+            <a:avLst/>
+          </a:prstGeom>
+          <a:noFill/>
+        </p:spPr>
+        <p:txBody>
+          <a:bodyPr wrap="none" rtlCol="0">
+            <a:spAutoFit/>
+          </a:bodyPr>
+          <a:lstStyle/>
+          <a:p>
+            <a:pPr algn="ctr"/>
+            <a:r>
+              <a:rPr lang="en-US" dirty="0" smtClean="0">
+                <a:solidFill>
+                  <a:schemeClr val="accent1"/>
+                </a:solidFill>
+                <a:latin typeface="Source Sans Pro" charset="0"/>
+                <a:ea typeface="Source Sans Pro" charset="0"/>
+                <a:cs typeface="Source Sans Pro" charset="0"/>
+              </a:rPr>
+              <a:t>Run</a:t>
+            </a:r>
+            <a:endParaRPr lang="en-US" dirty="0">
+              <a:solidFill>
+                <a:schemeClr val="accent1"/>
+              </a:solidFill>
+              <a:latin typeface="Source Sans Pro" charset="0"/>
+              <a:ea typeface="Source Sans Pro" charset="0"/>
+              <a:cs typeface="Source Sans Pro" charset="0"/>
+            </a:endParaRPr>
+          </a:p>
+        </p:txBody>
+      </p:sp>
+      <p:cxnSp>
+        <p:nvCxnSpPr>
+          <p:cNvPr id="48" name="Straight Arrow Connector 47"/>
+          <p:cNvCxnSpPr/>
+          <p:nvPr/>
+        </p:nvCxnSpPr>
+        <p:spPr>
+          <a:xfrm>
+            <a:off x="2023241" y="3588176"/>
+            <a:ext cx="0" cy="573493"/>
+          </a:xfrm>
+          <a:prstGeom prst="straightConnector1">
+            <a:avLst/>
+          </a:prstGeom>
+          <a:ln w="28575">
+            <a:solidFill>
+              <a:schemeClr val="accent1"/>
+            </a:solidFill>
+            <a:headEnd type="none" w="med" len="med"/>
+            <a:tailEnd type="triangle" w="med" len="med"/>
+          </a:ln>
+        </p:spPr>
+        <p:style>
+          <a:lnRef idx="1">
+            <a:schemeClr val="accent1"/>
+          </a:lnRef>
+          <a:fillRef idx="0">
+            <a:schemeClr val="accent1"/>
+          </a:fillRef>
+          <a:effectRef idx="0">
+            <a:schemeClr val="accent1"/>
+          </a:effectRef>
+          <a:fontRef idx="minor">
+            <a:schemeClr val="tx1"/>
+          </a:fontRef>
+        </p:style>
+      </p:cxnSp>
+      <p:sp>
+        <p:nvSpPr>
+          <p:cNvPr id="49" name="Rounded Rectangle 48"/>
+          <p:cNvSpPr/>
+          <p:nvPr/>
+        </p:nvSpPr>
+        <p:spPr>
+          <a:xfrm>
+            <a:off x="3891430" y="4576738"/>
+            <a:ext cx="2835795" cy="1271276"/>
+          </a:xfrm>
+          <a:prstGeom prst="roundRect">
+            <a:avLst>
+              <a:gd name="adj" fmla="val 15733"/>
+            </a:avLst>
+          </a:prstGeom>
+          <a:solidFill>
+            <a:schemeClr val="bg1"/>
+          </a:solidFill>
+          <a:ln w="12700">
+            <a:solidFill>
+              <a:schemeClr val="bg2"/>
+            </a:solidFill>
+          </a:ln>
+        </p:spPr>
+        <p:style>
+          <a:lnRef idx="2">
+            <a:schemeClr val="accent1">
+              <a:shade val="50000"/>
+            </a:schemeClr>
+          </a:lnRef>
+          <a:fillRef idx="1">
+            <a:schemeClr val="accent1"/>
+          </a:fillRef>
+          <a:effectRef idx="0">
+            <a:schemeClr val="accent1"/>
+          </a:effectRef>
+          <a:fontRef idx="minor">
+            <a:schemeClr val="lt1"/>
+          </a:fontRef>
+        </p:style>
+        <p:txBody>
+          <a:bodyPr rtlCol="0" anchor="ctr"/>
+          <a:lstStyle/>
+          <a:p>
+            <a:pPr algn="ctr"/>
+            <a:r>
+              <a:rPr lang="en-US" dirty="0" err="1" smtClean="0"/>
+              <a:t>vzv</a:t>
+            </a:r>
+            <a:endParaRPr lang="en-US" dirty="0"/>
+          </a:p>
+        </p:txBody>
+      </p:sp>
+      <p:sp>
+        <p:nvSpPr>
+          <p:cNvPr id="50" name="Rectangle 49"/>
+          <p:cNvSpPr/>
+          <p:nvPr/>
+        </p:nvSpPr>
+        <p:spPr>
+          <a:xfrm>
+            <a:off x="4510215" y="5171292"/>
+            <a:ext cx="2146620" cy="338554"/>
+          </a:xfrm>
+          <a:prstGeom prst="rect">
+            <a:avLst/>
+          </a:prstGeom>
+          <a:solidFill>
+            <a:schemeClr val="bg1"/>
+          </a:solidFill>
+          <a:ln>
+            <a:noFill/>
+          </a:ln>
+        </p:spPr>
+        <p:style>
+          <a:lnRef idx="2">
+            <a:schemeClr val="accent1">
+              <a:shade val="50000"/>
+            </a:schemeClr>
+          </a:lnRef>
+          <a:fillRef idx="1">
+            <a:schemeClr val="accent1"/>
+          </a:fillRef>
+          <a:effectRef idx="0">
+            <a:schemeClr val="accent1"/>
+          </a:effectRef>
+          <a:fontRef idx="minor">
+            <a:schemeClr val="lt1"/>
+          </a:fontRef>
+        </p:style>
+        <p:txBody>
+          <a:bodyPr rtlCol="0" anchor="ctr"/>
+          <a:lstStyle/>
+          <a:p>
+            <a:pPr algn="ctr"/>
+            <a:endParaRPr lang="en-US"/>
+          </a:p>
+        </p:txBody>
+      </p:sp>
+      <p:sp>
+        <p:nvSpPr>
+          <p:cNvPr id="53" name="TextBox 21"/>
+          <p:cNvSpPr txBox="1"/>
+          <p:nvPr/>
+        </p:nvSpPr>
+        <p:spPr>
+          <a:xfrm>
+            <a:off x="5162527" y="4777792"/>
+            <a:ext cx="1572704" cy="707886"/>
+          </a:xfrm>
+          <a:prstGeom prst="rect">
+            <a:avLst/>
+          </a:prstGeom>
+          <a:noFill/>
+        </p:spPr>
+        <p:txBody>
+          <a:bodyPr wrap="square" rtlCol="0">
+            <a:spAutoFit/>
+          </a:bodyPr>
+          <a:lstStyle/>
+          <a:p>
+            <a:pPr defTabSz="685783"/>
+            <a:r>
+              <a:rPr lang="en-US" sz="2000" dirty="0" smtClean="0">
+                <a:solidFill>
+                  <a:schemeClr val="tx1">
+                    <a:lumMod val="75000"/>
+                  </a:schemeClr>
+                </a:solidFill>
+                <a:latin typeface="Source Sans Pro Light" charset="0"/>
+                <a:ea typeface="Source Sans Pro Light" charset="0"/>
+                <a:cs typeface="Source Sans Pro Light" charset="0"/>
+              </a:rPr>
+              <a:t>Firmware </a:t>
+            </a:r>
+            <a:r>
+              <a:rPr lang="en-US" sz="2000" dirty="0" smtClean="0">
+                <a:solidFill>
+                  <a:schemeClr val="tx1">
+                    <a:lumMod val="75000"/>
+                  </a:schemeClr>
+                </a:solidFill>
+                <a:latin typeface="Source Sans Pro Light" charset="0"/>
+                <a:ea typeface="Source Sans Pro Light" charset="0"/>
+                <a:cs typeface="Source Sans Pro Light" charset="0"/>
+              </a:rPr>
+              <a:t/>
+            </a:r>
+            <a:br>
+              <a:rPr lang="en-US" sz="2000" dirty="0" smtClean="0">
+                <a:solidFill>
+                  <a:schemeClr val="tx1">
+                    <a:lumMod val="75000"/>
+                  </a:schemeClr>
+                </a:solidFill>
+                <a:latin typeface="Source Sans Pro Light" charset="0"/>
+                <a:ea typeface="Source Sans Pro Light" charset="0"/>
+                <a:cs typeface="Source Sans Pro Light" charset="0"/>
+              </a:rPr>
+            </a:br>
+            <a:r>
+              <a:rPr lang="en-US" sz="2000" dirty="0" smtClean="0">
+                <a:solidFill>
+                  <a:schemeClr val="tx1">
+                    <a:lumMod val="75000"/>
+                  </a:schemeClr>
+                </a:solidFill>
+                <a:latin typeface="Source Sans Pro Light" charset="0"/>
+                <a:ea typeface="Source Sans Pro Light" charset="0"/>
+                <a:cs typeface="Source Sans Pro Light" charset="0"/>
+              </a:rPr>
+              <a:t>(</a:t>
+            </a:r>
+            <a:r>
+              <a:rPr lang="en-US" sz="2000" dirty="0">
+                <a:solidFill>
+                  <a:schemeClr val="tx1">
+                    <a:lumMod val="75000"/>
+                  </a:schemeClr>
+                </a:solidFill>
+                <a:latin typeface="Source Sans Pro Light" charset="0"/>
+                <a:ea typeface="Source Sans Pro Light" charset="0"/>
+                <a:cs typeface="Source Sans Pro Light" charset="0"/>
+              </a:rPr>
+              <a:t>binary)</a:t>
+            </a:r>
+          </a:p>
+        </p:txBody>
+      </p:sp>
+      <p:pic>
+        <p:nvPicPr>
+          <p:cNvPr id="54" name="Picture 53"/>
+          <p:cNvPicPr>
+            <a:picLocks noChangeAspect="1"/>
+          </p:cNvPicPr>
+          <p:nvPr/>
+        </p:nvPicPr>
+        <p:blipFill>
+          <a:blip r:embed="rId10" cstate="print">
+            <a:extLst>
+              <a:ext uri="{28A0092B-C50C-407E-A947-70E740481C1C}">
+                <a14:useLocalDpi xmlns:a14="http://schemas.microsoft.com/office/drawing/2010/main" val="0"/>
+              </a:ext>
+            </a:extLst>
+          </a:blip>
+          <a:stretch>
+            <a:fillRect/>
+          </a:stretch>
+        </p:blipFill>
+        <p:spPr>
+          <a:xfrm>
+            <a:off x="4064794" y="4780959"/>
+            <a:ext cx="1018295" cy="1018295"/>
+          </a:xfrm>
+          <a:prstGeom prst="rect">
+            <a:avLst/>
+          </a:prstGeom>
+        </p:spPr>
+      </p:pic>
+      <p:sp>
+        <p:nvSpPr>
+          <p:cNvPr id="56" name="TextBox 37"/>
+          <p:cNvSpPr txBox="1"/>
+          <p:nvPr/>
+        </p:nvSpPr>
+        <p:spPr>
+          <a:xfrm>
+            <a:off x="5402571" y="3679119"/>
+            <a:ext cx="689612" cy="369332"/>
+          </a:xfrm>
+          <a:prstGeom prst="rect">
+            <a:avLst/>
+          </a:prstGeom>
+          <a:noFill/>
+        </p:spPr>
+        <p:txBody>
+          <a:bodyPr wrap="none" rtlCol="0">
+            <a:spAutoFit/>
+          </a:bodyPr>
+          <a:lstStyle/>
+          <a:p>
+            <a:pPr algn="ctr"/>
+            <a:r>
+              <a:rPr lang="en-US" dirty="0" smtClean="0">
+                <a:solidFill>
+                  <a:schemeClr val="accent1"/>
+                </a:solidFill>
+                <a:latin typeface="Source Sans Pro" charset="0"/>
+                <a:ea typeface="Source Sans Pro" charset="0"/>
+                <a:cs typeface="Source Sans Pro" charset="0"/>
+              </a:rPr>
+              <a:t>Build</a:t>
+            </a:r>
+            <a:endParaRPr lang="en-US" dirty="0">
+              <a:solidFill>
+                <a:schemeClr val="accent1"/>
+              </a:solidFill>
+              <a:latin typeface="Source Sans Pro" charset="0"/>
+              <a:ea typeface="Source Sans Pro" charset="0"/>
+              <a:cs typeface="Source Sans Pro" charset="0"/>
+            </a:endParaRPr>
+          </a:p>
+        </p:txBody>
+      </p:sp>
+      <p:cxnSp>
+        <p:nvCxnSpPr>
+          <p:cNvPr id="57" name="Straight Arrow Connector 56"/>
+          <p:cNvCxnSpPr/>
+          <p:nvPr/>
+        </p:nvCxnSpPr>
+        <p:spPr>
+          <a:xfrm>
+            <a:off x="5331122" y="3607906"/>
+            <a:ext cx="0" cy="573493"/>
+          </a:xfrm>
+          <a:prstGeom prst="straightConnector1">
+            <a:avLst/>
+          </a:prstGeom>
+          <a:ln w="28575">
+            <a:solidFill>
+              <a:schemeClr val="accent1"/>
+            </a:solidFill>
+            <a:headEnd type="none" w="med" len="med"/>
+            <a:tailEnd type="triangle" w="med" len="med"/>
+          </a:ln>
+        </p:spPr>
+        <p:style>
+          <a:lnRef idx="1">
+            <a:schemeClr val="accent1"/>
+          </a:lnRef>
+          <a:fillRef idx="0">
+            <a:schemeClr val="accent1"/>
+          </a:fillRef>
+          <a:effectRef idx="0">
+            <a:schemeClr val="accent1"/>
+          </a:effectRef>
+          <a:fontRef idx="minor">
+            <a:schemeClr val="tx1"/>
+          </a:fontRef>
+        </p:style>
+      </p:cxnSp>
+      <p:sp>
+        <p:nvSpPr>
+          <p:cNvPr id="59" name="TextBox 37"/>
+          <p:cNvSpPr txBox="1"/>
+          <p:nvPr/>
+        </p:nvSpPr>
+        <p:spPr>
+          <a:xfrm>
+            <a:off x="7117233" y="4821948"/>
+            <a:ext cx="696024" cy="369332"/>
+          </a:xfrm>
+          <a:prstGeom prst="rect">
+            <a:avLst/>
+          </a:prstGeom>
+          <a:noFill/>
+        </p:spPr>
+        <p:txBody>
+          <a:bodyPr wrap="none" rtlCol="0">
+            <a:spAutoFit/>
+          </a:bodyPr>
+          <a:lstStyle/>
+          <a:p>
+            <a:pPr algn="ctr"/>
+            <a:r>
+              <a:rPr lang="en-US" dirty="0" smtClean="0">
+                <a:solidFill>
+                  <a:schemeClr val="accent1"/>
+                </a:solidFill>
+                <a:latin typeface="Source Sans Pro" charset="0"/>
+                <a:ea typeface="Source Sans Pro" charset="0"/>
+                <a:cs typeface="Source Sans Pro" charset="0"/>
+              </a:rPr>
+              <a:t>Flash</a:t>
+            </a:r>
+            <a:endParaRPr lang="en-US" dirty="0">
+              <a:solidFill>
+                <a:schemeClr val="accent1"/>
+              </a:solidFill>
+              <a:latin typeface="Source Sans Pro" charset="0"/>
+              <a:ea typeface="Source Sans Pro" charset="0"/>
+              <a:cs typeface="Source Sans Pro" charset="0"/>
+            </a:endParaRPr>
+          </a:p>
+        </p:txBody>
+      </p:sp>
+      <p:cxnSp>
+        <p:nvCxnSpPr>
+          <p:cNvPr id="62" name="Elbow Connector 61"/>
+          <p:cNvCxnSpPr/>
+          <p:nvPr/>
+        </p:nvCxnSpPr>
+        <p:spPr>
+          <a:xfrm flipV="1">
+            <a:off x="6920084" y="5191280"/>
+            <a:ext cx="996747" cy="2"/>
+          </a:xfrm>
+          <a:prstGeom prst="bentConnector3">
+            <a:avLst>
+              <a:gd name="adj1" fmla="val 50000"/>
+            </a:avLst>
+          </a:prstGeom>
+          <a:ln w="28575">
+            <a:tailEnd type="triangle"/>
+          </a:ln>
+        </p:spPr>
+        <p:style>
+          <a:lnRef idx="1">
+            <a:schemeClr val="accent1"/>
+          </a:lnRef>
+          <a:fillRef idx="0">
+            <a:schemeClr val="accent1"/>
+          </a:fillRef>
+          <a:effectRef idx="0">
+            <a:schemeClr val="accent1"/>
+          </a:effectRef>
+          <a:fontRef idx="minor">
+            <a:schemeClr val="tx1"/>
+          </a:fontRef>
+        </p:style>
+      </p:cxnSp>
+      <p:cxnSp>
+        <p:nvCxnSpPr>
+          <p:cNvPr id="63" name="Elbow Connector 62"/>
+          <p:cNvCxnSpPr/>
+          <p:nvPr/>
+        </p:nvCxnSpPr>
+        <p:spPr>
+          <a:xfrm flipV="1">
+            <a:off x="6983084" y="2918440"/>
+            <a:ext cx="996747" cy="2"/>
+          </a:xfrm>
+          <a:prstGeom prst="bentConnector3">
+            <a:avLst>
+              <a:gd name="adj1" fmla="val 50000"/>
+            </a:avLst>
+          </a:prstGeom>
+          <a:ln w="28575">
+            <a:tailEnd type="triangle"/>
+          </a:ln>
+        </p:spPr>
+        <p:style>
+          <a:lnRef idx="1">
+            <a:schemeClr val="accent1"/>
+          </a:lnRef>
+          <a:fillRef idx="0">
+            <a:schemeClr val="accent1"/>
+          </a:fillRef>
+          <a:effectRef idx="0">
+            <a:schemeClr val="accent1"/>
+          </a:effectRef>
+          <a:fontRef idx="minor">
+            <a:schemeClr val="tx1"/>
+          </a:fontRef>
+        </p:style>
+      </p:cxnSp>
+      <p:sp>
+        <p:nvSpPr>
+          <p:cNvPr id="8" name="Rectangle 7"/>
+          <p:cNvSpPr/>
+          <p:nvPr/>
+        </p:nvSpPr>
+        <p:spPr>
+          <a:xfrm>
+            <a:off x="1499628" y="5823323"/>
+            <a:ext cx="1104790" cy="369332"/>
+          </a:xfrm>
+          <a:prstGeom prst="rect">
+            <a:avLst/>
+          </a:prstGeom>
+        </p:spPr>
+        <p:txBody>
+          <a:bodyPr wrap="none">
+            <a:spAutoFit/>
+          </a:bodyPr>
+          <a:lstStyle/>
+          <a:p>
+            <a:r>
+              <a:rPr lang="en-US" dirty="0">
+                <a:solidFill>
+                  <a:schemeClr val="tx1">
+                    <a:lumMod val="75000"/>
+                  </a:schemeClr>
+                </a:solidFill>
+                <a:latin typeface="Source Sans Pro Light" charset="0"/>
+                <a:ea typeface="Source Sans Pro Light" charset="0"/>
+                <a:cs typeface="Source Sans Pro Light" charset="0"/>
+              </a:rPr>
+              <a:t>Simulator</a:t>
+            </a:r>
+            <a:endParaRPr lang="en-US" dirty="0"/>
+          </a:p>
+        </p:txBody>
+      </p:sp>
+      <p:pic>
+        <p:nvPicPr>
+          <p:cNvPr id="9" name="Picture 8"/>
+          <p:cNvPicPr>
+            <a:picLocks noChangeAspect="1"/>
+          </p:cNvPicPr>
+          <p:nvPr/>
+        </p:nvPicPr>
+        <p:blipFill>
+          <a:blip r:embed="rId11" cstate="print">
+            <a:extLst>
+              <a:ext uri="{28A0092B-C50C-407E-A947-70E740481C1C}">
+                <a14:useLocalDpi xmlns:a14="http://schemas.microsoft.com/office/drawing/2010/main" val="0"/>
+              </a:ext>
+            </a:extLst>
+          </a:blip>
+          <a:stretch>
+            <a:fillRect/>
+          </a:stretch>
+        </p:blipFill>
+        <p:spPr>
+          <a:xfrm>
+            <a:off x="1098182" y="4375228"/>
+            <a:ext cx="1875834" cy="1500667"/>
+          </a:xfrm>
+          <a:prstGeom prst="rect">
+            <a:avLst/>
+          </a:prstGeom>
+        </p:spPr>
+      </p:pic>
     </p:spTree>
     <p:extLst>
       <p:ext uri="{BB962C8B-B14F-4D97-AF65-F5344CB8AC3E}">

</xml_diff>

<commit_message>
fix schema text rendering + missing Platform icon
</commit_message>
<xml_diff>
--- a/overview/images/2_download.pptx
+++ b/overview/images/2_download.pptx
@@ -4402,8 +4402,8 @@
         </p:nvSpPr>
         <p:spPr>
           <a:xfrm>
-            <a:off x="938616" y="4330645"/>
-            <a:ext cx="2066064" cy="1900807"/>
+            <a:off x="938616" y="3645024"/>
+            <a:ext cx="2066064" cy="1271276"/>
           </a:xfrm>
           <a:prstGeom prst="roundRect">
             <a:avLst>
@@ -4452,8 +4452,8 @@
         </p:nvSpPr>
         <p:spPr>
           <a:xfrm>
-            <a:off x="938617" y="2292007"/>
-            <a:ext cx="5800796" cy="1212313"/>
+            <a:off x="938617" y="1937827"/>
+            <a:ext cx="5800796" cy="900505"/>
           </a:xfrm>
           <a:prstGeom prst="roundRect">
             <a:avLst>
@@ -4506,7 +4506,7 @@
         </p:nvSpPr>
         <p:spPr>
           <a:xfrm>
-            <a:off x="8171174" y="4576738"/>
+            <a:off x="8171174" y="3645024"/>
             <a:ext cx="2797476" cy="1271276"/>
           </a:xfrm>
           <a:prstGeom prst="roundRect">
@@ -4664,8 +4664,8 @@
         </p:nvSpPr>
         <p:spPr>
           <a:xfrm>
-            <a:off x="6983516" y="2590209"/>
-            <a:ext cx="906017" cy="287130"/>
+            <a:off x="7062864" y="2236029"/>
+            <a:ext cx="747320" cy="271869"/>
           </a:xfrm>
           <a:prstGeom prst="rect">
             <a:avLst/>
@@ -4684,7 +4684,7 @@
               </a:lnSpc>
             </a:pPr>
             <a:r>
-              <a:rPr lang="en-US" dirty="0">
+              <a:rPr lang="en-US" sz="1400" dirty="0">
                 <a:solidFill>
                   <a:schemeClr val="accent1"/>
                 </a:solidFill>
@@ -4705,8 +4705,8 @@
         </p:nvSpPr>
         <p:spPr>
           <a:xfrm>
-            <a:off x="8239420" y="4991851"/>
-            <a:ext cx="934014" cy="411257"/>
+            <a:off x="8239420" y="4060137"/>
+            <a:ext cx="934014" cy="288147"/>
           </a:xfrm>
           <a:prstGeom prst="rect">
             <a:avLst/>
@@ -4725,7 +4725,7 @@
               <a:buClrTx/>
             </a:pPr>
             <a:r>
-              <a:rPr lang="en-US" sz="2200" dirty="0" smtClean="0">
+              <a:rPr lang="en-US" sz="1400" dirty="0" smtClean="0">
                 <a:solidFill>
                   <a:schemeClr val="tx1">
                     <a:lumMod val="75000"/>
@@ -4737,7 +4737,7 @@
               </a:rPr>
               <a:t>Target</a:t>
             </a:r>
-            <a:endParaRPr lang="en-US" sz="2200" dirty="0">
+            <a:endParaRPr lang="en-US" sz="1400" dirty="0">
               <a:solidFill>
                 <a:schemeClr val="tx1">
                   <a:lumMod val="75000"/>
@@ -4788,7 +4788,7 @@
         </p:nvGrpSpPr>
         <p:grpSpPr>
           <a:xfrm>
-            <a:off x="3992351" y="2125734"/>
+            <a:off x="3992351" y="1771554"/>
             <a:ext cx="1158355" cy="1367382"/>
             <a:chOff x="3878499" y="2275879"/>
             <a:chExt cx="1172018" cy="1383510"/>
@@ -4980,8 +4980,8 @@
         </p:nvSpPr>
         <p:spPr>
           <a:xfrm>
-            <a:off x="1121755" y="2542104"/>
-            <a:ext cx="2179553" cy="411257"/>
+            <a:off x="1121755" y="2187924"/>
+            <a:ext cx="2179553" cy="288147"/>
           </a:xfrm>
           <a:prstGeom prst="rect">
             <a:avLst/>
@@ -5000,7 +5000,7 @@
               <a:buClrTx/>
             </a:pPr>
             <a:r>
-              <a:rPr lang="en-US" sz="2200" dirty="0" smtClean="0">
+              <a:rPr lang="en-US" sz="1400" dirty="0" smtClean="0">
                 <a:solidFill>
                   <a:schemeClr val="tx1">
                     <a:lumMod val="75000"/>
@@ -5012,7 +5012,7 @@
               </a:rPr>
               <a:t>Your Workstation</a:t>
             </a:r>
-            <a:endParaRPr lang="en-US" sz="2200" dirty="0">
+            <a:endParaRPr lang="en-US" sz="1400" dirty="0">
               <a:solidFill>
                 <a:schemeClr val="tx1">
                   <a:lumMod val="75000"/>
@@ -5033,8 +5033,8 @@
         </p:nvSpPr>
         <p:spPr>
           <a:xfrm>
-            <a:off x="2293650" y="207488"/>
-            <a:ext cx="1402085" cy="1015663"/>
+            <a:off x="2293650" y="332656"/>
+            <a:ext cx="1402085" cy="738664"/>
           </a:xfrm>
           <a:prstGeom prst="rect">
             <a:avLst/>
@@ -5049,7 +5049,7 @@
           <a:p>
             <a:pPr algn="ctr" defTabSz="685783"/>
             <a:r>
-              <a:rPr lang="en-US" sz="2000" dirty="0" smtClean="0">
+              <a:rPr lang="en-US" sz="1400" dirty="0" smtClean="0">
                 <a:solidFill>
                   <a:schemeClr val="tx1">
                     <a:lumMod val="75000"/>
@@ -5061,21 +5061,8 @@
               </a:rPr>
               <a:t>SDK Tools Software </a:t>
             </a:r>
-            <a:r>
-              <a:rPr lang="en-US" sz="2000" dirty="0" smtClean="0">
-                <a:solidFill>
-                  <a:schemeClr val="tx1">
-                    <a:lumMod val="75000"/>
-                  </a:schemeClr>
-                </a:solidFill>
-                <a:latin typeface="Source Sans Pro Light" charset="0"/>
-                <a:ea typeface="Source Sans Pro Light" charset="0"/>
-                <a:cs typeface="Source Sans Pro Light" charset="0"/>
-              </a:rPr>
-              <a:t/>
-            </a:r>
             <a:br>
-              <a:rPr lang="en-US" sz="2000" dirty="0" smtClean="0">
+              <a:rPr lang="en-US" sz="1400" dirty="0" smtClean="0">
                 <a:solidFill>
                   <a:schemeClr val="tx1">
                     <a:lumMod val="75000"/>
@@ -5087,7 +5074,7 @@
               </a:rPr>
             </a:br>
             <a:r>
-              <a:rPr lang="en-US" sz="2000" dirty="0" smtClean="0">
+              <a:rPr lang="en-US" sz="1400" dirty="0" smtClean="0">
                 <a:solidFill>
                   <a:schemeClr val="tx1">
                     <a:lumMod val="75000"/>
@@ -5099,7 +5086,7 @@
               </a:rPr>
               <a:t>(.exe)</a:t>
             </a:r>
-            <a:endParaRPr lang="en-US" sz="2000" dirty="0">
+            <a:endParaRPr lang="en-US" sz="1400" dirty="0">
               <a:solidFill>
                 <a:schemeClr val="tx1">
                   <a:lumMod val="75000"/>
@@ -5120,8 +5107,8 @@
         </p:nvSpPr>
         <p:spPr>
           <a:xfrm>
-            <a:off x="4897605" y="207489"/>
-            <a:ext cx="1759230" cy="1015663"/>
+            <a:off x="4897605" y="314072"/>
+            <a:ext cx="1759230" cy="738664"/>
           </a:xfrm>
           <a:prstGeom prst="rect">
             <a:avLst/>
@@ -5136,7 +5123,7 @@
           <a:p>
             <a:pPr algn="ctr" defTabSz="685783"/>
             <a:r>
-              <a:rPr lang="en-US" sz="2000" dirty="0" smtClean="0">
+              <a:rPr lang="en-US" sz="1400" dirty="0">
                 <a:solidFill>
                   <a:schemeClr val="tx1">
                     <a:lumMod val="75000"/>
@@ -5146,13 +5133,26 @@
                 <a:ea typeface="Source Sans Pro Light" charset="0"/>
                 <a:cs typeface="Source Sans Pro Light" charset="0"/>
               </a:rPr>
-              <a:t>Platform </a:t>
+              <a:t>Platform</a:t>
+            </a:r>
+            <a:r>
+              <a:rPr lang="en-US" sz="1400" dirty="0" smtClean="0">
+                <a:solidFill>
+                  <a:schemeClr val="tx1">
+                    <a:lumMod val="75000"/>
+                  </a:schemeClr>
+                </a:solidFill>
+                <a:latin typeface="Source Sans Pro Light" charset="0"/>
+                <a:ea typeface="Source Sans Pro Light" charset="0"/>
+                <a:cs typeface="Source Sans Pro Light" charset="0"/>
+              </a:rPr>
+              <a:t> </a:t>
             </a:r>
           </a:p>
           <a:p>
             <a:pPr algn="ctr" defTabSz="685783"/>
             <a:r>
-              <a:rPr lang="en-US" sz="2000" dirty="0" smtClean="0">
+              <a:rPr lang="en-US" sz="1400" dirty="0" smtClean="0">
                 <a:solidFill>
                   <a:schemeClr val="tx1">
                     <a:lumMod val="75000"/>
@@ -5164,21 +5164,8 @@
               </a:rPr>
               <a:t>or</a:t>
             </a:r>
-            <a:r>
-              <a:rPr lang="en-US" sz="2000" dirty="0" smtClean="0">
-                <a:solidFill>
-                  <a:schemeClr val="tx1">
-                    <a:lumMod val="75000"/>
-                  </a:schemeClr>
-                </a:solidFill>
-                <a:latin typeface="Source Sans Pro Light" charset="0"/>
-                <a:ea typeface="Source Sans Pro Light" charset="0"/>
-                <a:cs typeface="Source Sans Pro Light" charset="0"/>
-              </a:rPr>
-              <a:t/>
-            </a:r>
             <a:br>
-              <a:rPr lang="en-US" sz="2000" dirty="0" smtClean="0">
+              <a:rPr lang="en-US" sz="1400" dirty="0" smtClean="0">
                 <a:solidFill>
                   <a:schemeClr val="tx1">
                     <a:lumMod val="75000"/>
@@ -5190,7 +5177,7 @@
               </a:rPr>
             </a:br>
             <a:r>
-              <a:rPr lang="en-US" sz="2000" dirty="0" smtClean="0">
+              <a:rPr lang="en-US" sz="1400" dirty="0" smtClean="0">
                 <a:solidFill>
                   <a:schemeClr val="tx1">
                     <a:lumMod val="75000"/>
@@ -5200,22 +5187,9 @@
                 <a:ea typeface="Source Sans Pro Light" charset="0"/>
                 <a:cs typeface="Source Sans Pro Light" charset="0"/>
               </a:rPr>
-              <a:t>Virtual </a:t>
-            </a:r>
-            <a:r>
-              <a:rPr lang="en-US" sz="2000" dirty="0" smtClean="0">
-                <a:solidFill>
-                  <a:schemeClr val="tx1">
-                    <a:lumMod val="75000"/>
-                  </a:schemeClr>
-                </a:solidFill>
-                <a:latin typeface="Source Sans Pro Light" charset="0"/>
-                <a:ea typeface="Source Sans Pro Light" charset="0"/>
-                <a:cs typeface="Source Sans Pro Light" charset="0"/>
-              </a:rPr>
-              <a:t>Device</a:t>
-            </a:r>
-            <a:endParaRPr lang="en-US" sz="2000" dirty="0">
+              <a:t>Virtual Device</a:t>
+            </a:r>
+            <a:endParaRPr lang="en-US" sz="1400" dirty="0">
               <a:solidFill>
                 <a:schemeClr val="tx1">
                   <a:lumMod val="75000"/>
@@ -5236,10 +5210,10 @@
         </p:nvGrpSpPr>
         <p:grpSpPr>
           <a:xfrm>
-            <a:off x="2335416" y="1480477"/>
-            <a:ext cx="807548" cy="573493"/>
+            <a:off x="2352125" y="1422047"/>
+            <a:ext cx="740220" cy="402398"/>
             <a:chOff x="1127448" y="1585249"/>
-            <a:chExt cx="807548" cy="573493"/>
+            <a:chExt cx="740220" cy="573493"/>
           </a:xfrm>
         </p:grpSpPr>
         <p:sp>
@@ -5250,8 +5224,8 @@
           </p:nvSpPr>
           <p:spPr>
             <a:xfrm>
-              <a:off x="1152409" y="1656462"/>
-              <a:ext cx="782587" cy="369332"/>
+              <a:off x="1219735" y="1656462"/>
+              <a:ext cx="647933" cy="307777"/>
             </a:xfrm>
             <a:prstGeom prst="rect">
               <a:avLst/>
@@ -5266,7 +5240,7 @@
             <a:p>
               <a:pPr algn="ctr"/>
               <a:r>
-                <a:rPr lang="en-US" dirty="0" smtClean="0">
+                <a:rPr lang="en-US" sz="1400" dirty="0" smtClean="0">
                   <a:solidFill>
                     <a:schemeClr val="accent1"/>
                   </a:solidFill>
@@ -5276,7 +5250,7 @@
                 </a:rPr>
                 <a:t>Install</a:t>
               </a:r>
-              <a:endParaRPr lang="en-US" dirty="0">
+              <a:endParaRPr lang="en-US" sz="1400" dirty="0">
                 <a:solidFill>
                   <a:schemeClr val="accent1"/>
                 </a:solidFill>
@@ -5333,10 +5307,10 @@
         </p:nvGrpSpPr>
         <p:grpSpPr>
           <a:xfrm>
-            <a:off x="5323222" y="1480477"/>
-            <a:ext cx="848309" cy="573493"/>
-            <a:chOff x="1119548" y="1585249"/>
-            <a:chExt cx="848309" cy="573493"/>
+            <a:off x="5331122" y="1438605"/>
+            <a:ext cx="766671" cy="343968"/>
+            <a:chOff x="1127448" y="1585249"/>
+            <a:chExt cx="766671" cy="573493"/>
           </a:xfrm>
         </p:grpSpPr>
         <p:sp>
@@ -5347,8 +5321,8 @@
           </p:nvSpPr>
           <p:spPr>
             <a:xfrm>
-              <a:off x="1119548" y="1656462"/>
-              <a:ext cx="848309" cy="369332"/>
+              <a:off x="1193286" y="1656462"/>
+              <a:ext cx="700833" cy="307777"/>
             </a:xfrm>
             <a:prstGeom prst="rect">
               <a:avLst/>
@@ -5363,7 +5337,7 @@
             <a:p>
               <a:pPr algn="ctr"/>
               <a:r>
-                <a:rPr lang="en-US" dirty="0" smtClean="0">
+                <a:rPr lang="en-US" sz="1400" dirty="0" smtClean="0">
                   <a:solidFill>
                     <a:schemeClr val="accent1"/>
                   </a:solidFill>
@@ -5373,7 +5347,7 @@
                 </a:rPr>
                 <a:t>Import</a:t>
               </a:r>
-              <a:endParaRPr lang="en-US" dirty="0">
+              <a:endParaRPr lang="en-US" sz="1400" dirty="0">
                 <a:solidFill>
                   <a:schemeClr val="accent1"/>
                 </a:solidFill>
@@ -5430,10 +5404,10 @@
         </p:nvGrpSpPr>
         <p:grpSpPr>
           <a:xfrm>
-            <a:off x="9278017" y="3705120"/>
-            <a:ext cx="1288448" cy="627647"/>
-            <a:chOff x="1127448" y="1585249"/>
-            <a:chExt cx="1288448" cy="627647"/>
+            <a:off x="8904312" y="2982356"/>
+            <a:ext cx="1601069" cy="476939"/>
+            <a:chOff x="1142256" y="1570653"/>
+            <a:chExt cx="911422" cy="409624"/>
           </a:xfrm>
         </p:grpSpPr>
         <p:sp>
@@ -5444,8 +5418,8 @@
           </p:nvSpPr>
           <p:spPr>
             <a:xfrm>
-              <a:off x="1195690" y="1656462"/>
-              <a:ext cx="1220206" cy="556434"/>
+              <a:off x="1145535" y="1629725"/>
+              <a:ext cx="908143" cy="323165"/>
             </a:xfrm>
             <a:prstGeom prst="rect">
               <a:avLst/>
@@ -5470,7 +5444,7 @@
                 </a:spcAft>
               </a:pPr>
               <a:r>
-                <a:rPr lang="en-US">
+                <a:rPr lang="en-US" sz="1400" dirty="0">
                   <a:solidFill>
                     <a:schemeClr val="accent1"/>
                   </a:solidFill>
@@ -5480,8 +5454,8 @@
                 </a:rPr>
                 <a:t>Download </a:t>
               </a:r>
-              <a:br>
-                <a:rPr lang="en-US">
+              <a:r>
+                <a:rPr lang="en-US" sz="1400" dirty="0" smtClean="0">
                   <a:solidFill>
                     <a:schemeClr val="accent1"/>
                   </a:solidFill>
@@ -5489,9 +5463,10 @@
                   <a:ea typeface="Source Sans Pro" charset="0"/>
                   <a:cs typeface="Source Sans Pro" charset="0"/>
                 </a:rPr>
-              </a:br>
+                <a:t>&amp; </a:t>
+              </a:r>
               <a:r>
-                <a:rPr lang="en-US">
+                <a:rPr lang="en-US" sz="1400" dirty="0">
                   <a:solidFill>
                     <a:schemeClr val="accent1"/>
                   </a:solidFill>
@@ -5499,16 +5474,8 @@
                   <a:ea typeface="Source Sans Pro" charset="0"/>
                   <a:cs typeface="Source Sans Pro" charset="0"/>
                 </a:rPr>
-                <a:t>&amp; Install</a:t>
+                <a:t>Install</a:t>
               </a:r>
-              <a:endParaRPr lang="en-US" dirty="0">
-                <a:solidFill>
-                  <a:schemeClr val="accent1"/>
-                </a:solidFill>
-                <a:latin typeface="Source Sans Pro" charset="0"/>
-                <a:ea typeface="Source Sans Pro" charset="0"/>
-                <a:cs typeface="Source Sans Pro" charset="0"/>
-              </a:endParaRPr>
             </a:p>
           </p:txBody>
         </p:sp>
@@ -5520,8 +5487,8 @@
           </p:nvCxnSpPr>
           <p:spPr>
             <a:xfrm>
-              <a:off x="1127448" y="1585249"/>
-              <a:ext cx="0" cy="573493"/>
+              <a:off x="1142256" y="1570653"/>
+              <a:ext cx="3279" cy="409624"/>
             </a:xfrm>
             <a:prstGeom prst="straightConnector1">
               <a:avLst/>
@@ -5558,8 +5525,8 @@
         </p:nvSpPr>
         <p:spPr>
           <a:xfrm>
-            <a:off x="8223502" y="2271182"/>
-            <a:ext cx="2835795" cy="1212313"/>
+            <a:off x="8224289" y="1956168"/>
+            <a:ext cx="2744362" cy="882164"/>
           </a:xfrm>
           <a:prstGeom prst="roundRect">
             <a:avLst>
@@ -5622,8 +5589,8 @@
         </p:blipFill>
         <p:spPr>
           <a:xfrm>
-            <a:off x="8009634" y="2255397"/>
-            <a:ext cx="1295510" cy="1325306"/>
+            <a:off x="8313800" y="1988840"/>
+            <a:ext cx="818405" cy="837228"/>
           </a:xfrm>
           <a:prstGeom prst="rect">
             <a:avLst/>
@@ -5652,7 +5619,7 @@
         </p:blipFill>
         <p:spPr>
           <a:xfrm>
-            <a:off x="9162008" y="2718114"/>
+            <a:off x="9128998" y="2248230"/>
             <a:ext cx="1863546" cy="346619"/>
           </a:xfrm>
           <a:prstGeom prst="rect">
@@ -5682,8 +5649,8 @@
         </p:blipFill>
         <p:spPr>
           <a:xfrm>
-            <a:off x="8943516" y="4635700"/>
-            <a:ext cx="2116567" cy="1153530"/>
+            <a:off x="9132205" y="3750459"/>
+            <a:ext cx="1774828" cy="967282"/>
           </a:xfrm>
           <a:prstGeom prst="rect">
             <a:avLst/>
@@ -5728,8 +5695,8 @@
         </p:nvSpPr>
         <p:spPr>
           <a:xfrm>
-            <a:off x="2155603" y="3659389"/>
-            <a:ext cx="567784" cy="369332"/>
+            <a:off x="2198083" y="3033839"/>
+            <a:ext cx="482824" cy="307777"/>
           </a:xfrm>
           <a:prstGeom prst="rect">
             <a:avLst/>
@@ -5744,7 +5711,7 @@
           <a:p>
             <a:pPr algn="ctr"/>
             <a:r>
-              <a:rPr lang="en-US" dirty="0" smtClean="0">
+              <a:rPr lang="en-US" sz="1400" dirty="0" smtClean="0">
                 <a:solidFill>
                   <a:schemeClr val="accent1"/>
                 </a:solidFill>
@@ -5754,7 +5721,7 @@
               </a:rPr>
               <a:t>Run</a:t>
             </a:r>
-            <a:endParaRPr lang="en-US" dirty="0">
+            <a:endParaRPr lang="en-US" sz="1400" dirty="0">
               <a:solidFill>
                 <a:schemeClr val="accent1"/>
               </a:solidFill>
@@ -5773,8 +5740,8 @@
         </p:nvCxnSpPr>
         <p:spPr>
           <a:xfrm>
-            <a:off x="2023241" y="3588176"/>
-            <a:ext cx="0" cy="573493"/>
+            <a:off x="2036099" y="2955153"/>
+            <a:ext cx="0" cy="473847"/>
           </a:xfrm>
           <a:prstGeom prst="straightConnector1">
             <a:avLst/>
@@ -5810,7 +5777,7 @@
         </p:nvSpPr>
         <p:spPr>
           <a:xfrm>
-            <a:off x="3891430" y="4576738"/>
+            <a:off x="3891430" y="3645024"/>
             <a:ext cx="2835795" cy="1271276"/>
           </a:xfrm>
           <a:prstGeom prst="roundRect">
@@ -5864,7 +5831,7 @@
         </p:nvSpPr>
         <p:spPr>
           <a:xfrm>
-            <a:off x="4510215" y="5171292"/>
+            <a:off x="4510215" y="4239578"/>
             <a:ext cx="2146620" cy="338554"/>
           </a:xfrm>
           <a:prstGeom prst="rect">
@@ -5910,8 +5877,8 @@
         </p:nvSpPr>
         <p:spPr>
           <a:xfrm>
-            <a:off x="5162527" y="4777792"/>
-            <a:ext cx="1572704" cy="707886"/>
+            <a:off x="5135282" y="4019052"/>
+            <a:ext cx="1572704" cy="523220"/>
           </a:xfrm>
           <a:prstGeom prst="rect">
             <a:avLst/>
@@ -5924,9 +5891,9 @@
           </a:bodyPr>
           <a:lstStyle/>
           <a:p>
-            <a:pPr defTabSz="685783"/>
-            <a:r>
-              <a:rPr lang="en-US" sz="2000" dirty="0" smtClean="0">
+            <a:pPr algn="ctr" defTabSz="685783"/>
+            <a:r>
+              <a:rPr lang="en-US" sz="1400" dirty="0" smtClean="0">
                 <a:solidFill>
                   <a:schemeClr val="tx1">
                     <a:lumMod val="75000"/>
@@ -5938,21 +5905,8 @@
               </a:rPr>
               <a:t>Firmware </a:t>
             </a:r>
-            <a:r>
-              <a:rPr lang="en-US" sz="2000" dirty="0" smtClean="0">
-                <a:solidFill>
-                  <a:schemeClr val="tx1">
-                    <a:lumMod val="75000"/>
-                  </a:schemeClr>
-                </a:solidFill>
-                <a:latin typeface="Source Sans Pro Light" charset="0"/>
-                <a:ea typeface="Source Sans Pro Light" charset="0"/>
-                <a:cs typeface="Source Sans Pro Light" charset="0"/>
-              </a:rPr>
-              <a:t/>
-            </a:r>
             <a:br>
-              <a:rPr lang="en-US" sz="2000" dirty="0" smtClean="0">
+              <a:rPr lang="en-US" sz="1400" dirty="0" smtClean="0">
                 <a:solidFill>
                   <a:schemeClr val="tx1">
                     <a:lumMod val="75000"/>
@@ -5964,7 +5918,7 @@
               </a:rPr>
             </a:br>
             <a:r>
-              <a:rPr lang="en-US" sz="2000" dirty="0" smtClean="0">
+              <a:rPr lang="en-US" sz="1400" dirty="0" smtClean="0">
                 <a:solidFill>
                   <a:schemeClr val="tx1">
                     <a:lumMod val="75000"/>
@@ -5977,7 +5931,7 @@
               <a:t>(</a:t>
             </a:r>
             <a:r>
-              <a:rPr lang="en-US" sz="2000" dirty="0">
+              <a:rPr lang="en-US" sz="1400" dirty="0">
                 <a:solidFill>
                   <a:schemeClr val="tx1">
                     <a:lumMod val="75000"/>
@@ -6014,7 +5968,7 @@
         </p:blipFill>
         <p:spPr>
           <a:xfrm>
-            <a:off x="4064794" y="4780959"/>
+            <a:off x="4064794" y="3849245"/>
             <a:ext cx="1018295" cy="1018295"/>
           </a:xfrm>
           <a:prstGeom prst="rect">
@@ -6030,8 +5984,8 @@
         </p:nvSpPr>
         <p:spPr>
           <a:xfrm>
-            <a:off x="5402571" y="3679119"/>
-            <a:ext cx="689612" cy="369332"/>
+            <a:off x="5457874" y="3053569"/>
+            <a:ext cx="579005" cy="307777"/>
           </a:xfrm>
           <a:prstGeom prst="rect">
             <a:avLst/>
@@ -6046,7 +6000,7 @@
           <a:p>
             <a:pPr algn="ctr"/>
             <a:r>
-              <a:rPr lang="en-US" dirty="0" smtClean="0">
+              <a:rPr lang="en-US" sz="1400" dirty="0" smtClean="0">
                 <a:solidFill>
                   <a:schemeClr val="accent1"/>
                 </a:solidFill>
@@ -6056,7 +6010,7 @@
               </a:rPr>
               <a:t>Build</a:t>
             </a:r>
-            <a:endParaRPr lang="en-US" dirty="0">
+            <a:endParaRPr lang="en-US" sz="1400" dirty="0">
               <a:solidFill>
                 <a:schemeClr val="accent1"/>
               </a:solidFill>
@@ -6075,8 +6029,8 @@
         </p:nvCxnSpPr>
         <p:spPr>
           <a:xfrm>
-            <a:off x="5331122" y="3607906"/>
-            <a:ext cx="0" cy="573493"/>
+            <a:off x="5331122" y="2982356"/>
+            <a:ext cx="0" cy="446644"/>
           </a:xfrm>
           <a:prstGeom prst="straightConnector1">
             <a:avLst/>
@@ -6112,8 +6066,8 @@
         </p:nvSpPr>
         <p:spPr>
           <a:xfrm>
-            <a:off x="7117233" y="4821948"/>
-            <a:ext cx="696024" cy="369332"/>
+            <a:off x="7174139" y="3890234"/>
+            <a:ext cx="582211" cy="307777"/>
           </a:xfrm>
           <a:prstGeom prst="rect">
             <a:avLst/>
@@ -6128,7 +6082,7 @@
           <a:p>
             <a:pPr algn="ctr"/>
             <a:r>
-              <a:rPr lang="en-US" dirty="0" smtClean="0">
+              <a:rPr lang="en-US" sz="1400" dirty="0" smtClean="0">
                 <a:solidFill>
                   <a:schemeClr val="accent1"/>
                 </a:solidFill>
@@ -6138,7 +6092,7 @@
               </a:rPr>
               <a:t>Flash</a:t>
             </a:r>
-            <a:endParaRPr lang="en-US" dirty="0">
+            <a:endParaRPr lang="en-US" sz="1400" dirty="0">
               <a:solidFill>
                 <a:schemeClr val="accent1"/>
               </a:solidFill>
@@ -6157,7 +6111,7 @@
         </p:nvCxnSpPr>
         <p:spPr>
           <a:xfrm flipV="1">
-            <a:off x="6920084" y="5191280"/>
+            <a:off x="6920084" y="4259566"/>
             <a:ext cx="996747" cy="2"/>
           </a:xfrm>
           <a:prstGeom prst="bentConnector3">
@@ -6192,7 +6146,7 @@
         </p:nvCxnSpPr>
         <p:spPr>
           <a:xfrm flipV="1">
-            <a:off x="6983084" y="2918440"/>
+            <a:off x="6983084" y="2564260"/>
             <a:ext cx="996747" cy="2"/>
           </a:xfrm>
           <a:prstGeom prst="bentConnector3">
@@ -6227,8 +6181,8 @@
         </p:nvSpPr>
         <p:spPr>
           <a:xfrm>
-            <a:off x="1499628" y="5823323"/>
-            <a:ext cx="1104790" cy="369332"/>
+            <a:off x="1521043" y="4646884"/>
+            <a:ext cx="901209" cy="307777"/>
           </a:xfrm>
           <a:prstGeom prst="rect">
             <a:avLst/>
@@ -6241,7 +6195,7 @@
           <a:lstStyle/>
           <a:p>
             <a:r>
-              <a:rPr lang="en-US" dirty="0">
+              <a:rPr lang="en-US" sz="1400" dirty="0">
                 <a:solidFill>
                   <a:schemeClr val="tx1">
                     <a:lumMod val="75000"/>
@@ -6253,7 +6207,7 @@
               </a:rPr>
               <a:t>Simulator</a:t>
             </a:r>
-            <a:endParaRPr lang="en-US" dirty="0"/>
+            <a:endParaRPr lang="en-US" sz="1400" dirty="0"/>
           </a:p>
         </p:txBody>
       </p:sp>
@@ -6279,8 +6233,8 @@
         </p:blipFill>
         <p:spPr>
           <a:xfrm>
-            <a:off x="1098182" y="4375228"/>
-            <a:ext cx="1875834" cy="1500667"/>
+            <a:off x="1501399" y="3683385"/>
+            <a:ext cx="1193228" cy="954582"/>
           </a:xfrm>
           <a:prstGeom prst="rect">
             <a:avLst/>

</xml_diff>

<commit_message>
replace SDK Tools Software to Software Development Tools
</commit_message>
<xml_diff>
--- a/overview/images/2_download.pptx
+++ b/overview/images/2_download.pptx
@@ -5059,32 +5059,7 @@
                 <a:ea typeface="Source Sans Pro Light" charset="0"/>
                 <a:cs typeface="Source Sans Pro Light" charset="0"/>
               </a:rPr>
-              <a:t>SDK Tools Software </a:t>
-            </a:r>
-            <a:br>
-              <a:rPr lang="en-US" sz="1400" dirty="0" smtClean="0">
-                <a:solidFill>
-                  <a:schemeClr val="tx1">
-                    <a:lumMod val="75000"/>
-                  </a:schemeClr>
-                </a:solidFill>
-                <a:latin typeface="Source Sans Pro Light" charset="0"/>
-                <a:ea typeface="Source Sans Pro Light" charset="0"/>
-                <a:cs typeface="Source Sans Pro Light" charset="0"/>
-              </a:rPr>
-            </a:br>
-            <a:r>
-              <a:rPr lang="en-US" sz="1400" dirty="0" smtClean="0">
-                <a:solidFill>
-                  <a:schemeClr val="tx1">
-                    <a:lumMod val="75000"/>
-                  </a:schemeClr>
-                </a:solidFill>
-                <a:latin typeface="Source Sans Pro Light" charset="0"/>
-                <a:ea typeface="Source Sans Pro Light" charset="0"/>
-                <a:cs typeface="Source Sans Pro Light" charset="0"/>
-              </a:rPr>
-              <a:t>(.exe)</a:t>
+              <a:t>Software Development Tools</a:t>
             </a:r>
             <a:endParaRPr lang="en-US" sz="1400" dirty="0">
               <a:solidFill>

</xml_diff>